<commit_message>
Add new images, documents, and README for Employee Attrition Analysis project
</commit_message>
<xml_diff>
--- a/DS6306_Project_Jonathan_Rocha.pptx
+++ b/DS6306_Project_Jonathan_Rocha.pptx
@@ -4,6 +4,9 @@
   <p:sldMasterIdLst>
     <p:sldMasterId id="2147483699" r:id="rId1"/>
   </p:sldMasterIdLst>
+  <p:notesMasterIdLst>
+    <p:notesMasterId r:id="rId13"/>
+  </p:notesMasterIdLst>
   <p:sldIdLst>
     <p:sldId id="256" r:id="rId2"/>
     <p:sldId id="257" r:id="rId3"/>
@@ -15264,7 +15267,7 @@
   <dgm:whole/>
   <dgm:extLst>
     <a:ext uri="http://schemas.microsoft.com/office/drawing/2008/diagram">
-      <dsp:dataModelExt xmlns:dsp="http://schemas.microsoft.com/office/drawing/2008/diagram" relId="rId8" minVer="http://schemas.openxmlformats.org/drawingml/2006/diagram"/>
+      <dsp:dataModelExt xmlns:dsp="http://schemas.microsoft.com/office/drawing/2008/diagram" relId="rId9" minVer="http://schemas.openxmlformats.org/drawingml/2006/diagram"/>
     </a:ext>
   </dgm:extLst>
 </dgm:dataModel>
@@ -15455,7 +15458,7 @@
   <dgm:whole/>
   <dgm:extLst>
     <a:ext uri="http://schemas.microsoft.com/office/drawing/2008/diagram">
-      <dsp:dataModelExt xmlns:dsp="http://schemas.microsoft.com/office/drawing/2008/diagram" relId="rId18" minVer="http://schemas.openxmlformats.org/drawingml/2006/diagram"/>
+      <dsp:dataModelExt xmlns:dsp="http://schemas.microsoft.com/office/drawing/2008/diagram" relId="rId19" minVer="http://schemas.openxmlformats.org/drawingml/2006/diagram"/>
     </a:ext>
   </dgm:extLst>
 </dgm:dataModel>
@@ -15541,7 +15544,7 @@
   <dgm:whole/>
   <dgm:extLst>
     <a:ext uri="http://schemas.microsoft.com/office/drawing/2008/diagram">
-      <dsp:dataModelExt xmlns:dsp="http://schemas.microsoft.com/office/drawing/2008/diagram" relId="rId8" minVer="http://schemas.openxmlformats.org/drawingml/2006/diagram"/>
+      <dsp:dataModelExt xmlns:dsp="http://schemas.microsoft.com/office/drawing/2008/diagram" relId="rId9" minVer="http://schemas.openxmlformats.org/drawingml/2006/diagram"/>
     </a:ext>
   </dgm:extLst>
 </dgm:dataModel>
@@ -15626,7 +15629,7 @@
   <dgm:whole/>
   <dgm:extLst>
     <a:ext uri="http://schemas.microsoft.com/office/drawing/2008/diagram">
-      <dsp:dataModelExt xmlns:dsp="http://schemas.microsoft.com/office/drawing/2008/diagram" relId="rId13" minVer="http://schemas.openxmlformats.org/drawingml/2006/diagram"/>
+      <dsp:dataModelExt xmlns:dsp="http://schemas.microsoft.com/office/drawing/2008/diagram" relId="rId14" minVer="http://schemas.openxmlformats.org/drawingml/2006/diagram"/>
     </a:ext>
   </dgm:extLst>
 </dgm:dataModel>
@@ -15817,7 +15820,7 @@
   <dgm:whole/>
   <dgm:extLst>
     <a:ext uri="http://schemas.microsoft.com/office/drawing/2008/diagram">
-      <dsp:dataModelExt xmlns:dsp="http://schemas.microsoft.com/office/drawing/2008/diagram" relId="rId18" minVer="http://schemas.openxmlformats.org/drawingml/2006/diagram"/>
+      <dsp:dataModelExt xmlns:dsp="http://schemas.microsoft.com/office/drawing/2008/diagram" relId="rId19" minVer="http://schemas.openxmlformats.org/drawingml/2006/diagram"/>
     </a:ext>
   </dgm:extLst>
 </dgm:dataModel>
@@ -15903,7 +15906,7 @@
   <dgm:whole/>
   <dgm:extLst>
     <a:ext uri="http://schemas.microsoft.com/office/drawing/2008/diagram">
-      <dsp:dataModelExt xmlns:dsp="http://schemas.microsoft.com/office/drawing/2008/diagram" relId="rId7" minVer="http://schemas.openxmlformats.org/drawingml/2006/diagram"/>
+      <dsp:dataModelExt xmlns:dsp="http://schemas.microsoft.com/office/drawing/2008/diagram" relId="rId8" minVer="http://schemas.openxmlformats.org/drawingml/2006/diagram"/>
     </a:ext>
   </dgm:extLst>
 </dgm:dataModel>
@@ -16128,7 +16131,7 @@
   <dgm:whole/>
   <dgm:extLst>
     <a:ext uri="http://schemas.microsoft.com/office/drawing/2008/diagram">
-      <dsp:dataModelExt xmlns:dsp="http://schemas.microsoft.com/office/drawing/2008/diagram" relId="rId12" minVer="http://schemas.openxmlformats.org/drawingml/2006/diagram"/>
+      <dsp:dataModelExt xmlns:dsp="http://schemas.microsoft.com/office/drawing/2008/diagram" relId="rId13" minVer="http://schemas.openxmlformats.org/drawingml/2006/diagram"/>
     </a:ext>
   </dgm:extLst>
 </dgm:dataModel>
@@ -16214,7 +16217,7 @@
   <dgm:whole/>
   <dgm:extLst>
     <a:ext uri="http://schemas.microsoft.com/office/drawing/2008/diagram">
-      <dsp:dataModelExt xmlns:dsp="http://schemas.microsoft.com/office/drawing/2008/diagram" relId="rId8" minVer="http://schemas.openxmlformats.org/drawingml/2006/diagram"/>
+      <dsp:dataModelExt xmlns:dsp="http://schemas.microsoft.com/office/drawing/2008/diagram" relId="rId9" minVer="http://schemas.openxmlformats.org/drawingml/2006/diagram"/>
     </a:ext>
   </dgm:extLst>
 </dgm:dataModel>
@@ -16491,7 +16494,7 @@
   <dgm:whole/>
   <dgm:extLst>
     <a:ext uri="http://schemas.microsoft.com/office/drawing/2008/diagram">
-      <dsp:dataModelExt xmlns:dsp="http://schemas.microsoft.com/office/drawing/2008/diagram" relId="rId13" minVer="http://schemas.openxmlformats.org/drawingml/2006/diagram"/>
+      <dsp:dataModelExt xmlns:dsp="http://schemas.microsoft.com/office/drawing/2008/diagram" relId="rId14" minVer="http://schemas.openxmlformats.org/drawingml/2006/diagram"/>
     </a:ext>
   </dgm:extLst>
 </dgm:dataModel>
@@ -16577,7 +16580,7 @@
   <dgm:whole/>
   <dgm:extLst>
     <a:ext uri="http://schemas.microsoft.com/office/drawing/2008/diagram">
-      <dsp:dataModelExt xmlns:dsp="http://schemas.microsoft.com/office/drawing/2008/diagram" relId="rId8" minVer="http://schemas.openxmlformats.org/drawingml/2006/diagram"/>
+      <dsp:dataModelExt xmlns:dsp="http://schemas.microsoft.com/office/drawing/2008/diagram" relId="rId9" minVer="http://schemas.openxmlformats.org/drawingml/2006/diagram"/>
     </a:ext>
   </dgm:extLst>
 </dgm:dataModel>
@@ -16813,7 +16816,7 @@
   <dgm:whole/>
   <dgm:extLst>
     <a:ext uri="http://schemas.microsoft.com/office/drawing/2008/diagram">
-      <dsp:dataModelExt xmlns:dsp="http://schemas.microsoft.com/office/drawing/2008/diagram" relId="rId14" minVer="http://schemas.openxmlformats.org/drawingml/2006/diagram"/>
+      <dsp:dataModelExt xmlns:dsp="http://schemas.microsoft.com/office/drawing/2008/diagram" relId="rId15" minVer="http://schemas.openxmlformats.org/drawingml/2006/diagram"/>
     </a:ext>
   </dgm:extLst>
 </dgm:dataModel>
@@ -17110,7 +17113,7 @@
   <dgm:whole/>
   <dgm:extLst>
     <a:ext uri="http://schemas.microsoft.com/office/drawing/2008/diagram">
-      <dsp:dataModelExt xmlns:dsp="http://schemas.microsoft.com/office/drawing/2008/diagram" relId="rId13" minVer="http://schemas.openxmlformats.org/drawingml/2006/diagram"/>
+      <dsp:dataModelExt xmlns:dsp="http://schemas.microsoft.com/office/drawing/2008/diagram" relId="rId14" minVer="http://schemas.openxmlformats.org/drawingml/2006/diagram"/>
     </a:ext>
   </dgm:extLst>
 </dgm:dataModel>
@@ -17196,7 +17199,7 @@
   <dgm:whole/>
   <dgm:extLst>
     <a:ext uri="http://schemas.microsoft.com/office/drawing/2008/diagram">
-      <dsp:dataModelExt xmlns:dsp="http://schemas.microsoft.com/office/drawing/2008/diagram" relId="rId8" minVer="http://schemas.openxmlformats.org/drawingml/2006/diagram"/>
+      <dsp:dataModelExt xmlns:dsp="http://schemas.microsoft.com/office/drawing/2008/diagram" relId="rId9" minVer="http://schemas.openxmlformats.org/drawingml/2006/diagram"/>
     </a:ext>
   </dgm:extLst>
 </dgm:dataModel>
@@ -17440,7 +17443,7 @@
   <dgm:whole/>
   <dgm:extLst>
     <a:ext uri="http://schemas.microsoft.com/office/drawing/2008/diagram">
-      <dsp:dataModelExt xmlns:dsp="http://schemas.microsoft.com/office/drawing/2008/diagram" relId="rId13" minVer="http://schemas.openxmlformats.org/drawingml/2006/diagram"/>
+      <dsp:dataModelExt xmlns:dsp="http://schemas.microsoft.com/office/drawing/2008/diagram" relId="rId14" minVer="http://schemas.openxmlformats.org/drawingml/2006/diagram"/>
     </a:ext>
   </dgm:extLst>
 </dgm:dataModel>
@@ -17526,7 +17529,7 @@
   <dgm:whole/>
   <dgm:extLst>
     <a:ext uri="http://schemas.microsoft.com/office/drawing/2008/diagram">
-      <dsp:dataModelExt xmlns:dsp="http://schemas.microsoft.com/office/drawing/2008/diagram" relId="rId8" minVer="http://schemas.openxmlformats.org/drawingml/2006/diagram"/>
+      <dsp:dataModelExt xmlns:dsp="http://schemas.microsoft.com/office/drawing/2008/diagram" relId="rId9" minVer="http://schemas.openxmlformats.org/drawingml/2006/diagram"/>
     </a:ext>
   </dgm:extLst>
 </dgm:dataModel>
@@ -17611,7 +17614,7 @@
   <dgm:whole/>
   <dgm:extLst>
     <a:ext uri="http://schemas.microsoft.com/office/drawing/2008/diagram">
-      <dsp:dataModelExt xmlns:dsp="http://schemas.microsoft.com/office/drawing/2008/diagram" relId="rId13" minVer="http://schemas.openxmlformats.org/drawingml/2006/diagram"/>
+      <dsp:dataModelExt xmlns:dsp="http://schemas.microsoft.com/office/drawing/2008/diagram" relId="rId14" minVer="http://schemas.openxmlformats.org/drawingml/2006/diagram"/>
     </a:ext>
   </dgm:extLst>
 </dgm:dataModel>
@@ -17802,7 +17805,7 @@
   <dgm:whole/>
   <dgm:extLst>
     <a:ext uri="http://schemas.microsoft.com/office/drawing/2008/diagram">
-      <dsp:dataModelExt xmlns:dsp="http://schemas.microsoft.com/office/drawing/2008/diagram" relId="rId18" minVer="http://schemas.openxmlformats.org/drawingml/2006/diagram"/>
+      <dsp:dataModelExt xmlns:dsp="http://schemas.microsoft.com/office/drawing/2008/diagram" relId="rId19" minVer="http://schemas.openxmlformats.org/drawingml/2006/diagram"/>
     </a:ext>
   </dgm:extLst>
 </dgm:dataModel>
@@ -17888,7 +17891,7 @@
   <dgm:whole/>
   <dgm:extLst>
     <a:ext uri="http://schemas.microsoft.com/office/drawing/2008/diagram">
-      <dsp:dataModelExt xmlns:dsp="http://schemas.microsoft.com/office/drawing/2008/diagram" relId="rId8" minVer="http://schemas.openxmlformats.org/drawingml/2006/diagram"/>
+      <dsp:dataModelExt xmlns:dsp="http://schemas.microsoft.com/office/drawing/2008/diagram" relId="rId9" minVer="http://schemas.openxmlformats.org/drawingml/2006/diagram"/>
     </a:ext>
   </dgm:extLst>
 </dgm:dataModel>
@@ -17973,7 +17976,7 @@
   <dgm:whole/>
   <dgm:extLst>
     <a:ext uri="http://schemas.microsoft.com/office/drawing/2008/diagram">
-      <dsp:dataModelExt xmlns:dsp="http://schemas.microsoft.com/office/drawing/2008/diagram" relId="rId13" minVer="http://schemas.openxmlformats.org/drawingml/2006/diagram"/>
+      <dsp:dataModelExt xmlns:dsp="http://schemas.microsoft.com/office/drawing/2008/diagram" relId="rId14" minVer="http://schemas.openxmlformats.org/drawingml/2006/diagram"/>
     </a:ext>
   </dgm:extLst>
 </dgm:dataModel>
@@ -48233,6 +48236,1477 @@
 </dgm:styleDef>
 </file>
 
+<file path=ppt/notesMasters/notesMaster1.xml><?xml version="1.0" encoding="utf-8"?>
+<p:notesMaster xmlns:a="http://schemas.openxmlformats.org/drawingml/2006/main" xmlns:r="http://schemas.openxmlformats.org/officeDocument/2006/relationships" xmlns:p="http://schemas.openxmlformats.org/presentationml/2006/main">
+  <p:cSld>
+    <p:bg>
+      <p:bgRef idx="1001">
+        <a:schemeClr val="bg1"/>
+      </p:bgRef>
+    </p:bg>
+    <p:spTree>
+      <p:nvGrpSpPr>
+        <p:cNvPr id="1" name=""/>
+        <p:cNvGrpSpPr/>
+        <p:nvPr/>
+      </p:nvGrpSpPr>
+      <p:grpSpPr>
+        <a:xfrm>
+          <a:off x="0" y="0"/>
+          <a:ext cx="0" cy="0"/>
+          <a:chOff x="0" y="0"/>
+          <a:chExt cx="0" cy="0"/>
+        </a:xfrm>
+      </p:grpSpPr>
+      <p:sp>
+        <p:nvSpPr>
+          <p:cNvPr id="2" name="Header Placeholder 1"/>
+          <p:cNvSpPr>
+            <a:spLocks noGrp="1"/>
+          </p:cNvSpPr>
+          <p:nvPr>
+            <p:ph type="hdr" sz="quarter"/>
+          </p:nvPr>
+        </p:nvSpPr>
+        <p:spPr>
+          <a:xfrm>
+            <a:off x="0" y="0"/>
+            <a:ext cx="2971800" cy="458788"/>
+          </a:xfrm>
+          <a:prstGeom prst="rect">
+            <a:avLst/>
+          </a:prstGeom>
+        </p:spPr>
+        <p:txBody>
+          <a:bodyPr vert="horz" lIns="91440" tIns="45720" rIns="91440" bIns="45720" rtlCol="0"/>
+          <a:lstStyle>
+            <a:lvl1pPr algn="l">
+              <a:defRPr sz="1200"/>
+            </a:lvl1pPr>
+          </a:lstStyle>
+          <a:p>
+            <a:endParaRPr lang="en-US"/>
+          </a:p>
+        </p:txBody>
+      </p:sp>
+      <p:sp>
+        <p:nvSpPr>
+          <p:cNvPr id="3" name="Date Placeholder 2"/>
+          <p:cNvSpPr>
+            <a:spLocks noGrp="1"/>
+          </p:cNvSpPr>
+          <p:nvPr>
+            <p:ph type="dt" idx="1"/>
+          </p:nvPr>
+        </p:nvSpPr>
+        <p:spPr>
+          <a:xfrm>
+            <a:off x="3884613" y="0"/>
+            <a:ext cx="2971800" cy="458788"/>
+          </a:xfrm>
+          <a:prstGeom prst="rect">
+            <a:avLst/>
+          </a:prstGeom>
+        </p:spPr>
+        <p:txBody>
+          <a:bodyPr vert="horz" lIns="91440" tIns="45720" rIns="91440" bIns="45720" rtlCol="0"/>
+          <a:lstStyle>
+            <a:lvl1pPr algn="r">
+              <a:defRPr sz="1200"/>
+            </a:lvl1pPr>
+          </a:lstStyle>
+          <a:p>
+            <a:fld id="{7A4CB0C0-B0C0-7C46-8461-1A05A2AFE330}" type="datetimeFigureOut">
+              <a:rPr lang="en-US" smtClean="0"/>
+              <a:t>3/10/25</a:t>
+            </a:fld>
+            <a:endParaRPr lang="en-US"/>
+          </a:p>
+        </p:txBody>
+      </p:sp>
+      <p:sp>
+        <p:nvSpPr>
+          <p:cNvPr id="4" name="Slide Image Placeholder 3"/>
+          <p:cNvSpPr>
+            <a:spLocks noGrp="1" noRot="1" noChangeAspect="1"/>
+          </p:cNvSpPr>
+          <p:nvPr>
+            <p:ph type="sldImg" idx="2"/>
+          </p:nvPr>
+        </p:nvSpPr>
+        <p:spPr>
+          <a:xfrm>
+            <a:off x="685800" y="1143000"/>
+            <a:ext cx="5486400" cy="3086100"/>
+          </a:xfrm>
+          <a:prstGeom prst="rect">
+            <a:avLst/>
+          </a:prstGeom>
+          <a:noFill/>
+          <a:ln w="12700">
+            <a:solidFill>
+              <a:prstClr val="black"/>
+            </a:solidFill>
+          </a:ln>
+        </p:spPr>
+        <p:txBody>
+          <a:bodyPr vert="horz" lIns="91440" tIns="45720" rIns="91440" bIns="45720" rtlCol="0" anchor="ctr"/>
+          <a:lstStyle/>
+          <a:p>
+            <a:endParaRPr lang="en-US"/>
+          </a:p>
+        </p:txBody>
+      </p:sp>
+      <p:sp>
+        <p:nvSpPr>
+          <p:cNvPr id="5" name="Notes Placeholder 4"/>
+          <p:cNvSpPr>
+            <a:spLocks noGrp="1"/>
+          </p:cNvSpPr>
+          <p:nvPr>
+            <p:ph type="body" sz="quarter" idx="3"/>
+          </p:nvPr>
+        </p:nvSpPr>
+        <p:spPr>
+          <a:xfrm>
+            <a:off x="685800" y="4400550"/>
+            <a:ext cx="5486400" cy="3600450"/>
+          </a:xfrm>
+          <a:prstGeom prst="rect">
+            <a:avLst/>
+          </a:prstGeom>
+        </p:spPr>
+        <p:txBody>
+          <a:bodyPr vert="horz" lIns="91440" tIns="45720" rIns="91440" bIns="45720" rtlCol="0"/>
+          <a:lstStyle/>
+          <a:p>
+            <a:pPr lvl="0"/>
+            <a:r>
+              <a:rPr lang="en-US"/>
+              <a:t>Click to edit Master text styles</a:t>
+            </a:r>
+          </a:p>
+          <a:p>
+            <a:pPr lvl="1"/>
+            <a:r>
+              <a:rPr lang="en-US"/>
+              <a:t>Second level</a:t>
+            </a:r>
+          </a:p>
+          <a:p>
+            <a:pPr lvl="2"/>
+            <a:r>
+              <a:rPr lang="en-US"/>
+              <a:t>Third level</a:t>
+            </a:r>
+          </a:p>
+          <a:p>
+            <a:pPr lvl="3"/>
+            <a:r>
+              <a:rPr lang="en-US"/>
+              <a:t>Fourth level</a:t>
+            </a:r>
+          </a:p>
+          <a:p>
+            <a:pPr lvl="4"/>
+            <a:r>
+              <a:rPr lang="en-US"/>
+              <a:t>Fifth level</a:t>
+            </a:r>
+          </a:p>
+        </p:txBody>
+      </p:sp>
+      <p:sp>
+        <p:nvSpPr>
+          <p:cNvPr id="6" name="Footer Placeholder 5"/>
+          <p:cNvSpPr>
+            <a:spLocks noGrp="1"/>
+          </p:cNvSpPr>
+          <p:nvPr>
+            <p:ph type="ftr" sz="quarter" idx="4"/>
+          </p:nvPr>
+        </p:nvSpPr>
+        <p:spPr>
+          <a:xfrm>
+            <a:off x="0" y="8685213"/>
+            <a:ext cx="2971800" cy="458787"/>
+          </a:xfrm>
+          <a:prstGeom prst="rect">
+            <a:avLst/>
+          </a:prstGeom>
+        </p:spPr>
+        <p:txBody>
+          <a:bodyPr vert="horz" lIns="91440" tIns="45720" rIns="91440" bIns="45720" rtlCol="0" anchor="b"/>
+          <a:lstStyle>
+            <a:lvl1pPr algn="l">
+              <a:defRPr sz="1200"/>
+            </a:lvl1pPr>
+          </a:lstStyle>
+          <a:p>
+            <a:endParaRPr lang="en-US"/>
+          </a:p>
+        </p:txBody>
+      </p:sp>
+      <p:sp>
+        <p:nvSpPr>
+          <p:cNvPr id="7" name="Slide Number Placeholder 6"/>
+          <p:cNvSpPr>
+            <a:spLocks noGrp="1"/>
+          </p:cNvSpPr>
+          <p:nvPr>
+            <p:ph type="sldNum" sz="quarter" idx="5"/>
+          </p:nvPr>
+        </p:nvSpPr>
+        <p:spPr>
+          <a:xfrm>
+            <a:off x="3884613" y="8685213"/>
+            <a:ext cx="2971800" cy="458787"/>
+          </a:xfrm>
+          <a:prstGeom prst="rect">
+            <a:avLst/>
+          </a:prstGeom>
+        </p:spPr>
+        <p:txBody>
+          <a:bodyPr vert="horz" lIns="91440" tIns="45720" rIns="91440" bIns="45720" rtlCol="0" anchor="b"/>
+          <a:lstStyle>
+            <a:lvl1pPr algn="r">
+              <a:defRPr sz="1200"/>
+            </a:lvl1pPr>
+          </a:lstStyle>
+          <a:p>
+            <a:fld id="{652A5D94-0C48-8048-BC64-3851A8530D1C}" type="slidenum">
+              <a:rPr lang="en-US" smtClean="0"/>
+              <a:t>‹#›</a:t>
+            </a:fld>
+            <a:endParaRPr lang="en-US"/>
+          </a:p>
+        </p:txBody>
+      </p:sp>
+    </p:spTree>
+    <p:extLst>
+      <p:ext uri="{BB962C8B-B14F-4D97-AF65-F5344CB8AC3E}">
+        <p14:creationId xmlns:p14="http://schemas.microsoft.com/office/powerpoint/2010/main" val="2458902849"/>
+      </p:ext>
+    </p:extLst>
+  </p:cSld>
+  <p:clrMap bg1="lt1" tx1="dk1" bg2="lt2" tx2="dk2" accent1="accent1" accent2="accent2" accent3="accent3" accent4="accent4" accent5="accent5" accent6="accent6" hlink="hlink" folHlink="folHlink"/>
+  <p:notesStyle>
+    <a:lvl1pPr marL="0" algn="l" defTabSz="914400" rtl="0" eaLnBrk="1" latinLnBrk="0" hangingPunct="1">
+      <a:defRPr sz="1200" kern="1200">
+        <a:solidFill>
+          <a:schemeClr val="tx1"/>
+        </a:solidFill>
+        <a:latin typeface="+mn-lt"/>
+        <a:ea typeface="+mn-ea"/>
+        <a:cs typeface="+mn-cs"/>
+      </a:defRPr>
+    </a:lvl1pPr>
+    <a:lvl2pPr marL="457200" algn="l" defTabSz="914400" rtl="0" eaLnBrk="1" latinLnBrk="0" hangingPunct="1">
+      <a:defRPr sz="1200" kern="1200">
+        <a:solidFill>
+          <a:schemeClr val="tx1"/>
+        </a:solidFill>
+        <a:latin typeface="+mn-lt"/>
+        <a:ea typeface="+mn-ea"/>
+        <a:cs typeface="+mn-cs"/>
+      </a:defRPr>
+    </a:lvl2pPr>
+    <a:lvl3pPr marL="914400" algn="l" defTabSz="914400" rtl="0" eaLnBrk="1" latinLnBrk="0" hangingPunct="1">
+      <a:defRPr sz="1200" kern="1200">
+        <a:solidFill>
+          <a:schemeClr val="tx1"/>
+        </a:solidFill>
+        <a:latin typeface="+mn-lt"/>
+        <a:ea typeface="+mn-ea"/>
+        <a:cs typeface="+mn-cs"/>
+      </a:defRPr>
+    </a:lvl3pPr>
+    <a:lvl4pPr marL="1371600" algn="l" defTabSz="914400" rtl="0" eaLnBrk="1" latinLnBrk="0" hangingPunct="1">
+      <a:defRPr sz="1200" kern="1200">
+        <a:solidFill>
+          <a:schemeClr val="tx1"/>
+        </a:solidFill>
+        <a:latin typeface="+mn-lt"/>
+        <a:ea typeface="+mn-ea"/>
+        <a:cs typeface="+mn-cs"/>
+      </a:defRPr>
+    </a:lvl4pPr>
+    <a:lvl5pPr marL="1828800" algn="l" defTabSz="914400" rtl="0" eaLnBrk="1" latinLnBrk="0" hangingPunct="1">
+      <a:defRPr sz="1200" kern="1200">
+        <a:solidFill>
+          <a:schemeClr val="tx1"/>
+        </a:solidFill>
+        <a:latin typeface="+mn-lt"/>
+        <a:ea typeface="+mn-ea"/>
+        <a:cs typeface="+mn-cs"/>
+      </a:defRPr>
+    </a:lvl5pPr>
+    <a:lvl6pPr marL="2286000" algn="l" defTabSz="914400" rtl="0" eaLnBrk="1" latinLnBrk="0" hangingPunct="1">
+      <a:defRPr sz="1200" kern="1200">
+        <a:solidFill>
+          <a:schemeClr val="tx1"/>
+        </a:solidFill>
+        <a:latin typeface="+mn-lt"/>
+        <a:ea typeface="+mn-ea"/>
+        <a:cs typeface="+mn-cs"/>
+      </a:defRPr>
+    </a:lvl6pPr>
+    <a:lvl7pPr marL="2743200" algn="l" defTabSz="914400" rtl="0" eaLnBrk="1" latinLnBrk="0" hangingPunct="1">
+      <a:defRPr sz="1200" kern="1200">
+        <a:solidFill>
+          <a:schemeClr val="tx1"/>
+        </a:solidFill>
+        <a:latin typeface="+mn-lt"/>
+        <a:ea typeface="+mn-ea"/>
+        <a:cs typeface="+mn-cs"/>
+      </a:defRPr>
+    </a:lvl7pPr>
+    <a:lvl8pPr marL="3200400" algn="l" defTabSz="914400" rtl="0" eaLnBrk="1" latinLnBrk="0" hangingPunct="1">
+      <a:defRPr sz="1200" kern="1200">
+        <a:solidFill>
+          <a:schemeClr val="tx1"/>
+        </a:solidFill>
+        <a:latin typeface="+mn-lt"/>
+        <a:ea typeface="+mn-ea"/>
+        <a:cs typeface="+mn-cs"/>
+      </a:defRPr>
+    </a:lvl8pPr>
+    <a:lvl9pPr marL="3657600" algn="l" defTabSz="914400" rtl="0" eaLnBrk="1" latinLnBrk="0" hangingPunct="1">
+      <a:defRPr sz="1200" kern="1200">
+        <a:solidFill>
+          <a:schemeClr val="tx1"/>
+        </a:solidFill>
+        <a:latin typeface="+mn-lt"/>
+        <a:ea typeface="+mn-ea"/>
+        <a:cs typeface="+mn-cs"/>
+      </a:defRPr>
+    </a:lvl9pPr>
+  </p:notesStyle>
+</p:notesMaster>
+</file>
+
+<file path=ppt/notesSlides/notesSlide1.xml><?xml version="1.0" encoding="utf-8"?>
+<p:notes xmlns:a="http://schemas.openxmlformats.org/drawingml/2006/main" xmlns:r="http://schemas.openxmlformats.org/officeDocument/2006/relationships" xmlns:p="http://schemas.openxmlformats.org/presentationml/2006/main">
+  <p:cSld>
+    <p:spTree>
+      <p:nvGrpSpPr>
+        <p:cNvPr id="1" name=""/>
+        <p:cNvGrpSpPr/>
+        <p:nvPr/>
+      </p:nvGrpSpPr>
+      <p:grpSpPr>
+        <a:xfrm>
+          <a:off x="0" y="0"/>
+          <a:ext cx="0" cy="0"/>
+          <a:chOff x="0" y="0"/>
+          <a:chExt cx="0" cy="0"/>
+        </a:xfrm>
+      </p:grpSpPr>
+      <p:sp>
+        <p:nvSpPr>
+          <p:cNvPr id="2" name="Slide Image Placeholder 1"/>
+          <p:cNvSpPr>
+            <a:spLocks noGrp="1" noRot="1" noChangeAspect="1"/>
+          </p:cNvSpPr>
+          <p:nvPr>
+            <p:ph type="sldImg"/>
+          </p:nvPr>
+        </p:nvSpPr>
+        <p:spPr/>
+      </p:sp>
+      <p:sp>
+        <p:nvSpPr>
+          <p:cNvPr id="3" name="Notes Placeholder 2"/>
+          <p:cNvSpPr>
+            <a:spLocks noGrp="1"/>
+          </p:cNvSpPr>
+          <p:nvPr>
+            <p:ph type="body" idx="1"/>
+          </p:nvPr>
+        </p:nvSpPr>
+        <p:spPr/>
+        <p:txBody>
+          <a:bodyPr/>
+          <a:lstStyle/>
+          <a:p>
+            <a:r>
+              <a:rPr lang="en-US" sz="1800" kern="0" dirty="0">
+                <a:effectLst/>
+                <a:latin typeface="Times New Roman" panose="02020603050405020304" pitchFamily="18" charset="0"/>
+                <a:ea typeface="Times New Roman" panose="02020603050405020304" pitchFamily="18" charset="0"/>
+              </a:rPr>
+              <a:t>Good afternoon. Today I'll be presenting my exploratory data analysis of employee attrition at Frito Lay. As part of </a:t>
+            </a:r>
+            <a:r>
+              <a:rPr lang="en-US" sz="1800" kern="0" dirty="0" err="1">
+                <a:effectLst/>
+                <a:latin typeface="Times New Roman" panose="02020603050405020304" pitchFamily="18" charset="0"/>
+                <a:ea typeface="Times New Roman" panose="02020603050405020304" pitchFamily="18" charset="0"/>
+              </a:rPr>
+              <a:t>DDSAnalytics</a:t>
+            </a:r>
+            <a:r>
+              <a:rPr lang="en-US" sz="1800" kern="0" dirty="0">
+                <a:effectLst/>
+                <a:latin typeface="Times New Roman" panose="02020603050405020304" pitchFamily="18" charset="0"/>
+                <a:ea typeface="Times New Roman" panose="02020603050405020304" pitchFamily="18" charset="0"/>
+              </a:rPr>
+              <a:t>' work, I've analyzed factors related to employee turnover and started developing predictive models to help Frito Lay reduce attrition costs</a:t>
+            </a:r>
+            <a:r>
+              <a:rPr lang="en-US" dirty="0">
+                <a:effectLst/>
+              </a:rPr>
+              <a:t> </a:t>
+            </a:r>
+            <a:endParaRPr lang="en-US" dirty="0"/>
+          </a:p>
+        </p:txBody>
+      </p:sp>
+      <p:sp>
+        <p:nvSpPr>
+          <p:cNvPr id="4" name="Slide Number Placeholder 3"/>
+          <p:cNvSpPr>
+            <a:spLocks noGrp="1"/>
+          </p:cNvSpPr>
+          <p:nvPr>
+            <p:ph type="sldNum" sz="quarter" idx="5"/>
+          </p:nvPr>
+        </p:nvSpPr>
+        <p:spPr/>
+        <p:txBody>
+          <a:bodyPr/>
+          <a:lstStyle/>
+          <a:p>
+            <a:fld id="{652A5D94-0C48-8048-BC64-3851A8530D1C}" type="slidenum">
+              <a:rPr lang="en-US" smtClean="0"/>
+              <a:t>1</a:t>
+            </a:fld>
+            <a:endParaRPr lang="en-US"/>
+          </a:p>
+        </p:txBody>
+      </p:sp>
+    </p:spTree>
+    <p:extLst>
+      <p:ext uri="{BB962C8B-B14F-4D97-AF65-F5344CB8AC3E}">
+        <p14:creationId xmlns:p14="http://schemas.microsoft.com/office/powerpoint/2010/main" val="2760898464"/>
+      </p:ext>
+    </p:extLst>
+  </p:cSld>
+  <p:clrMapOvr>
+    <a:masterClrMapping/>
+  </p:clrMapOvr>
+</p:notes>
+</file>
+
+<file path=ppt/notesSlides/notesSlide10.xml><?xml version="1.0" encoding="utf-8"?>
+<p:notes xmlns:a="http://schemas.openxmlformats.org/drawingml/2006/main" xmlns:r="http://schemas.openxmlformats.org/officeDocument/2006/relationships" xmlns:p="http://schemas.openxmlformats.org/presentationml/2006/main">
+  <p:cSld>
+    <p:spTree>
+      <p:nvGrpSpPr>
+        <p:cNvPr id="1" name=""/>
+        <p:cNvGrpSpPr/>
+        <p:nvPr/>
+      </p:nvGrpSpPr>
+      <p:grpSpPr>
+        <a:xfrm>
+          <a:off x="0" y="0"/>
+          <a:ext cx="0" cy="0"/>
+          <a:chOff x="0" y="0"/>
+          <a:chExt cx="0" cy="0"/>
+        </a:xfrm>
+      </p:grpSpPr>
+      <p:sp>
+        <p:nvSpPr>
+          <p:cNvPr id="2" name="Slide Image Placeholder 1"/>
+          <p:cNvSpPr>
+            <a:spLocks noGrp="1" noRot="1" noChangeAspect="1"/>
+          </p:cNvSpPr>
+          <p:nvPr>
+            <p:ph type="sldImg"/>
+          </p:nvPr>
+        </p:nvSpPr>
+        <p:spPr/>
+      </p:sp>
+      <p:sp>
+        <p:nvSpPr>
+          <p:cNvPr id="3" name="Notes Placeholder 2"/>
+          <p:cNvSpPr>
+            <a:spLocks noGrp="1"/>
+          </p:cNvSpPr>
+          <p:nvPr>
+            <p:ph type="body" idx="1"/>
+          </p:nvPr>
+        </p:nvSpPr>
+        <p:spPr/>
+        <p:txBody>
+          <a:bodyPr/>
+          <a:lstStyle/>
+          <a:p>
+            <a:r>
+              <a:rPr lang="en-US" sz="1800" kern="0" dirty="0">
+                <a:effectLst/>
+                <a:latin typeface="Times New Roman" panose="02020603050405020304" pitchFamily="18" charset="0"/>
+                <a:ea typeface="Times New Roman" panose="02020603050405020304" pitchFamily="18" charset="0"/>
+              </a:rPr>
+              <a:t>Moving forward, I plan to implement feature engineering to create derived variables that may improve model performance. I'll also address class imbalance using ROSE sampling and explore additional modeling approaches including Random Forest and Gradient Boosting. These steps should help us exceed the 60% sensitivity and specificity requirements</a:t>
+            </a:r>
+            <a:r>
+              <a:rPr lang="en-US" dirty="0">
+                <a:effectLst/>
+              </a:rPr>
+              <a:t> </a:t>
+            </a:r>
+            <a:endParaRPr lang="en-US" dirty="0"/>
+          </a:p>
+        </p:txBody>
+      </p:sp>
+      <p:sp>
+        <p:nvSpPr>
+          <p:cNvPr id="4" name="Slide Number Placeholder 3"/>
+          <p:cNvSpPr>
+            <a:spLocks noGrp="1"/>
+          </p:cNvSpPr>
+          <p:nvPr>
+            <p:ph type="sldNum" sz="quarter" idx="5"/>
+          </p:nvPr>
+        </p:nvSpPr>
+        <p:spPr/>
+        <p:txBody>
+          <a:bodyPr/>
+          <a:lstStyle/>
+          <a:p>
+            <a:fld id="{652A5D94-0C48-8048-BC64-3851A8530D1C}" type="slidenum">
+              <a:rPr lang="en-US" smtClean="0"/>
+              <a:t>10</a:t>
+            </a:fld>
+            <a:endParaRPr lang="en-US"/>
+          </a:p>
+        </p:txBody>
+      </p:sp>
+    </p:spTree>
+    <p:extLst>
+      <p:ext uri="{BB962C8B-B14F-4D97-AF65-F5344CB8AC3E}">
+        <p14:creationId xmlns:p14="http://schemas.microsoft.com/office/powerpoint/2010/main" val="3412878723"/>
+      </p:ext>
+    </p:extLst>
+  </p:cSld>
+  <p:clrMapOvr>
+    <a:masterClrMapping/>
+  </p:clrMapOvr>
+</p:notes>
+</file>
+
+<file path=ppt/notesSlides/notesSlide11.xml><?xml version="1.0" encoding="utf-8"?>
+<p:notes xmlns:a="http://schemas.openxmlformats.org/drawingml/2006/main" xmlns:r="http://schemas.openxmlformats.org/officeDocument/2006/relationships" xmlns:p="http://schemas.openxmlformats.org/presentationml/2006/main">
+  <p:cSld>
+    <p:spTree>
+      <p:nvGrpSpPr>
+        <p:cNvPr id="1" name=""/>
+        <p:cNvGrpSpPr/>
+        <p:nvPr/>
+      </p:nvGrpSpPr>
+      <p:grpSpPr>
+        <a:xfrm>
+          <a:off x="0" y="0"/>
+          <a:ext cx="0" cy="0"/>
+          <a:chOff x="0" y="0"/>
+          <a:chExt cx="0" cy="0"/>
+        </a:xfrm>
+      </p:grpSpPr>
+      <p:sp>
+        <p:nvSpPr>
+          <p:cNvPr id="2" name="Slide Image Placeholder 1"/>
+          <p:cNvSpPr>
+            <a:spLocks noGrp="1" noRot="1" noChangeAspect="1"/>
+          </p:cNvSpPr>
+          <p:nvPr>
+            <p:ph type="sldImg"/>
+          </p:nvPr>
+        </p:nvSpPr>
+        <p:spPr/>
+      </p:sp>
+      <p:sp>
+        <p:nvSpPr>
+          <p:cNvPr id="3" name="Notes Placeholder 2"/>
+          <p:cNvSpPr>
+            <a:spLocks noGrp="1"/>
+          </p:cNvSpPr>
+          <p:nvPr>
+            <p:ph type="body" idx="1"/>
+          </p:nvPr>
+        </p:nvSpPr>
+        <p:spPr/>
+        <p:txBody>
+          <a:bodyPr/>
+          <a:lstStyle/>
+          <a:p>
+            <a:r>
+              <a:rPr lang="en-US" sz="1800" kern="0" dirty="0">
+                <a:effectLst/>
+                <a:latin typeface="Times New Roman" panose="02020603050405020304" pitchFamily="18" charset="0"/>
+                <a:ea typeface="Times New Roman" panose="02020603050405020304" pitchFamily="18" charset="0"/>
+              </a:rPr>
+              <a:t>Thank you for your attention. </a:t>
+            </a:r>
+            <a:r>
+              <a:rPr lang="en-US" sz="1800" kern="0">
+                <a:effectLst/>
+                <a:latin typeface="Times New Roman" panose="02020603050405020304" pitchFamily="18" charset="0"/>
+                <a:ea typeface="Times New Roman" panose="02020603050405020304" pitchFamily="18" charset="0"/>
+              </a:rPr>
+              <a:t>I welcome any questions about my analysis so far.</a:t>
+            </a:r>
+            <a:r>
+              <a:rPr lang="en-US">
+                <a:effectLst/>
+              </a:rPr>
+              <a:t> </a:t>
+            </a:r>
+            <a:endParaRPr lang="en-US"/>
+          </a:p>
+        </p:txBody>
+      </p:sp>
+      <p:sp>
+        <p:nvSpPr>
+          <p:cNvPr id="4" name="Slide Number Placeholder 3"/>
+          <p:cNvSpPr>
+            <a:spLocks noGrp="1"/>
+          </p:cNvSpPr>
+          <p:nvPr>
+            <p:ph type="sldNum" sz="quarter" idx="5"/>
+          </p:nvPr>
+        </p:nvSpPr>
+        <p:spPr/>
+        <p:txBody>
+          <a:bodyPr/>
+          <a:lstStyle/>
+          <a:p>
+            <a:fld id="{652A5D94-0C48-8048-BC64-3851A8530D1C}" type="slidenum">
+              <a:rPr lang="en-US" smtClean="0"/>
+              <a:t>11</a:t>
+            </a:fld>
+            <a:endParaRPr lang="en-US"/>
+          </a:p>
+        </p:txBody>
+      </p:sp>
+    </p:spTree>
+    <p:extLst>
+      <p:ext uri="{BB962C8B-B14F-4D97-AF65-F5344CB8AC3E}">
+        <p14:creationId xmlns:p14="http://schemas.microsoft.com/office/powerpoint/2010/main" val="1153736965"/>
+      </p:ext>
+    </p:extLst>
+  </p:cSld>
+  <p:clrMapOvr>
+    <a:masterClrMapping/>
+  </p:clrMapOvr>
+</p:notes>
+</file>
+
+<file path=ppt/notesSlides/notesSlide2.xml><?xml version="1.0" encoding="utf-8"?>
+<p:notes xmlns:a="http://schemas.openxmlformats.org/drawingml/2006/main" xmlns:r="http://schemas.openxmlformats.org/officeDocument/2006/relationships" xmlns:p="http://schemas.openxmlformats.org/presentationml/2006/main">
+  <p:cSld>
+    <p:spTree>
+      <p:nvGrpSpPr>
+        <p:cNvPr id="1" name=""/>
+        <p:cNvGrpSpPr/>
+        <p:nvPr/>
+      </p:nvGrpSpPr>
+      <p:grpSpPr>
+        <a:xfrm>
+          <a:off x="0" y="0"/>
+          <a:ext cx="0" cy="0"/>
+          <a:chOff x="0" y="0"/>
+          <a:chExt cx="0" cy="0"/>
+        </a:xfrm>
+      </p:grpSpPr>
+      <p:sp>
+        <p:nvSpPr>
+          <p:cNvPr id="2" name="Slide Image Placeholder 1"/>
+          <p:cNvSpPr>
+            <a:spLocks noGrp="1" noRot="1" noChangeAspect="1"/>
+          </p:cNvSpPr>
+          <p:nvPr>
+            <p:ph type="sldImg"/>
+          </p:nvPr>
+        </p:nvSpPr>
+        <p:spPr/>
+      </p:sp>
+      <p:sp>
+        <p:nvSpPr>
+          <p:cNvPr id="3" name="Notes Placeholder 2"/>
+          <p:cNvSpPr>
+            <a:spLocks noGrp="1"/>
+          </p:cNvSpPr>
+          <p:nvPr>
+            <p:ph type="body" idx="1"/>
+          </p:nvPr>
+        </p:nvSpPr>
+        <p:spPr/>
+        <p:txBody>
+          <a:bodyPr/>
+          <a:lstStyle/>
+          <a:p>
+            <a:r>
+              <a:rPr lang="en-US" sz="1800" kern="0" dirty="0">
+                <a:effectLst/>
+                <a:latin typeface="Times New Roman" panose="02020603050405020304" pitchFamily="18" charset="0"/>
+                <a:ea typeface="Times New Roman" panose="02020603050405020304" pitchFamily="18" charset="0"/>
+              </a:rPr>
+              <a:t>Employee turnover is costly for Frito Lay, with replacement costs ranging from 50% to 400% of an employee's annual salary. My analysis has identified key factors driving attrition, which I'll discuss shortly. I've also begun developing predictive models with the goal of achieving at least 60% sensitivity and specificity. Initial estimates suggest this approach could potentially save millions in turnover costs.</a:t>
+            </a:r>
+            <a:r>
+              <a:rPr lang="en-US" dirty="0">
+                <a:effectLst/>
+              </a:rPr>
+              <a:t> </a:t>
+            </a:r>
+            <a:endParaRPr lang="en-US" dirty="0"/>
+          </a:p>
+        </p:txBody>
+      </p:sp>
+      <p:sp>
+        <p:nvSpPr>
+          <p:cNvPr id="4" name="Slide Number Placeholder 3"/>
+          <p:cNvSpPr>
+            <a:spLocks noGrp="1"/>
+          </p:cNvSpPr>
+          <p:nvPr>
+            <p:ph type="sldNum" sz="quarter" idx="5"/>
+          </p:nvPr>
+        </p:nvSpPr>
+        <p:spPr/>
+        <p:txBody>
+          <a:bodyPr/>
+          <a:lstStyle/>
+          <a:p>
+            <a:fld id="{652A5D94-0C48-8048-BC64-3851A8530D1C}" type="slidenum">
+              <a:rPr lang="en-US" smtClean="0"/>
+              <a:t>2</a:t>
+            </a:fld>
+            <a:endParaRPr lang="en-US"/>
+          </a:p>
+        </p:txBody>
+      </p:sp>
+    </p:spTree>
+    <p:extLst>
+      <p:ext uri="{BB962C8B-B14F-4D97-AF65-F5344CB8AC3E}">
+        <p14:creationId xmlns:p14="http://schemas.microsoft.com/office/powerpoint/2010/main" val="2153393225"/>
+      </p:ext>
+    </p:extLst>
+  </p:cSld>
+  <p:clrMapOvr>
+    <a:masterClrMapping/>
+  </p:clrMapOvr>
+</p:notes>
+</file>
+
+<file path=ppt/notesSlides/notesSlide3.xml><?xml version="1.0" encoding="utf-8"?>
+<p:notes xmlns:a="http://schemas.openxmlformats.org/drawingml/2006/main" xmlns:r="http://schemas.openxmlformats.org/officeDocument/2006/relationships" xmlns:p="http://schemas.openxmlformats.org/presentationml/2006/main">
+  <p:cSld>
+    <p:spTree>
+      <p:nvGrpSpPr>
+        <p:cNvPr id="1" name=""/>
+        <p:cNvGrpSpPr/>
+        <p:nvPr/>
+      </p:nvGrpSpPr>
+      <p:grpSpPr>
+        <a:xfrm>
+          <a:off x="0" y="0"/>
+          <a:ext cx="0" cy="0"/>
+          <a:chOff x="0" y="0"/>
+          <a:chExt cx="0" cy="0"/>
+        </a:xfrm>
+      </p:grpSpPr>
+      <p:sp>
+        <p:nvSpPr>
+          <p:cNvPr id="2" name="Slide Image Placeholder 1"/>
+          <p:cNvSpPr>
+            <a:spLocks noGrp="1" noRot="1" noChangeAspect="1"/>
+          </p:cNvSpPr>
+          <p:nvPr>
+            <p:ph type="sldImg"/>
+          </p:nvPr>
+        </p:nvSpPr>
+        <p:spPr/>
+      </p:sp>
+      <p:sp>
+        <p:nvSpPr>
+          <p:cNvPr id="3" name="Notes Placeholder 2"/>
+          <p:cNvSpPr>
+            <a:spLocks noGrp="1"/>
+          </p:cNvSpPr>
+          <p:nvPr>
+            <p:ph type="body" idx="1"/>
+          </p:nvPr>
+        </p:nvSpPr>
+        <p:spPr/>
+        <p:txBody>
+          <a:bodyPr/>
+          <a:lstStyle/>
+          <a:p>
+            <a:r>
+              <a:rPr lang="en-US" sz="1800" kern="0" dirty="0">
+                <a:effectLst/>
+                <a:latin typeface="Times New Roman" panose="02020603050405020304" pitchFamily="18" charset="0"/>
+                <a:ea typeface="Times New Roman" panose="02020603050405020304" pitchFamily="18" charset="0"/>
+              </a:rPr>
+              <a:t>In our dataset of 870 employees, 140 left the company, representing an attrition rate of 16.1%. While this might seem moderate, the financial impact is significant due to high replacement costs. Understanding this baseline helps contextualize the patterns I've identified in my exploratory analysis.</a:t>
+            </a:r>
+            <a:r>
+              <a:rPr lang="en-US" dirty="0">
+                <a:effectLst/>
+              </a:rPr>
+              <a:t> </a:t>
+            </a:r>
+            <a:endParaRPr lang="en-US" dirty="0"/>
+          </a:p>
+        </p:txBody>
+      </p:sp>
+      <p:sp>
+        <p:nvSpPr>
+          <p:cNvPr id="4" name="Slide Number Placeholder 3"/>
+          <p:cNvSpPr>
+            <a:spLocks noGrp="1"/>
+          </p:cNvSpPr>
+          <p:nvPr>
+            <p:ph type="sldNum" sz="quarter" idx="5"/>
+          </p:nvPr>
+        </p:nvSpPr>
+        <p:spPr/>
+        <p:txBody>
+          <a:bodyPr/>
+          <a:lstStyle/>
+          <a:p>
+            <a:fld id="{652A5D94-0C48-8048-BC64-3851A8530D1C}" type="slidenum">
+              <a:rPr lang="en-US" smtClean="0"/>
+              <a:t>3</a:t>
+            </a:fld>
+            <a:endParaRPr lang="en-US"/>
+          </a:p>
+        </p:txBody>
+      </p:sp>
+    </p:spTree>
+    <p:extLst>
+      <p:ext uri="{BB962C8B-B14F-4D97-AF65-F5344CB8AC3E}">
+        <p14:creationId xmlns:p14="http://schemas.microsoft.com/office/powerpoint/2010/main" val="2578415290"/>
+      </p:ext>
+    </p:extLst>
+  </p:cSld>
+  <p:clrMapOvr>
+    <a:masterClrMapping/>
+  </p:clrMapOvr>
+</p:notes>
+</file>
+
+<file path=ppt/notesSlides/notesSlide4.xml><?xml version="1.0" encoding="utf-8"?>
+<p:notes xmlns:a="http://schemas.openxmlformats.org/drawingml/2006/main" xmlns:r="http://schemas.openxmlformats.org/officeDocument/2006/relationships" xmlns:p="http://schemas.openxmlformats.org/presentationml/2006/main">
+  <p:cSld>
+    <p:spTree>
+      <p:nvGrpSpPr>
+        <p:cNvPr id="1" name=""/>
+        <p:cNvGrpSpPr/>
+        <p:nvPr/>
+      </p:nvGrpSpPr>
+      <p:grpSpPr>
+        <a:xfrm>
+          <a:off x="0" y="0"/>
+          <a:ext cx="0" cy="0"/>
+          <a:chOff x="0" y="0"/>
+          <a:chExt cx="0" cy="0"/>
+        </a:xfrm>
+      </p:grpSpPr>
+      <p:sp>
+        <p:nvSpPr>
+          <p:cNvPr id="2" name="Slide Image Placeholder 1"/>
+          <p:cNvSpPr>
+            <a:spLocks noGrp="1" noRot="1" noChangeAspect="1"/>
+          </p:cNvSpPr>
+          <p:nvPr>
+            <p:ph type="sldImg"/>
+          </p:nvPr>
+        </p:nvSpPr>
+        <p:spPr/>
+      </p:sp>
+      <p:sp>
+        <p:nvSpPr>
+          <p:cNvPr id="3" name="Notes Placeholder 2"/>
+          <p:cNvSpPr>
+            <a:spLocks noGrp="1"/>
+          </p:cNvSpPr>
+          <p:nvPr>
+            <p:ph type="body" idx="1"/>
+          </p:nvPr>
+        </p:nvSpPr>
+        <p:spPr/>
+        <p:txBody>
+          <a:bodyPr/>
+          <a:lstStyle/>
+          <a:p>
+            <a:r>
+              <a:rPr lang="en-US" sz="1800" kern="0" dirty="0">
+                <a:effectLst/>
+                <a:latin typeface="Times New Roman" panose="02020603050405020304" pitchFamily="18" charset="0"/>
+                <a:ea typeface="Times New Roman" panose="02020603050405020304" pitchFamily="18" charset="0"/>
+              </a:rPr>
+              <a:t>My analytical process involved cleaning the data and removing non-predictive variables. I examined 31 variables across demographic factors, job characteristics, satisfaction measures, and career metrics. I used descriptive statistics, correlation analysis, and visualization techniques to identify patterns in the data.</a:t>
+            </a:r>
+            <a:r>
+              <a:rPr lang="en-US" dirty="0">
+                <a:effectLst/>
+              </a:rPr>
+              <a:t> </a:t>
+            </a:r>
+            <a:endParaRPr lang="en-US" dirty="0"/>
+          </a:p>
+        </p:txBody>
+      </p:sp>
+      <p:sp>
+        <p:nvSpPr>
+          <p:cNvPr id="4" name="Slide Number Placeholder 3"/>
+          <p:cNvSpPr>
+            <a:spLocks noGrp="1"/>
+          </p:cNvSpPr>
+          <p:nvPr>
+            <p:ph type="sldNum" sz="quarter" idx="5"/>
+          </p:nvPr>
+        </p:nvSpPr>
+        <p:spPr/>
+        <p:txBody>
+          <a:bodyPr/>
+          <a:lstStyle/>
+          <a:p>
+            <a:fld id="{652A5D94-0C48-8048-BC64-3851A8530D1C}" type="slidenum">
+              <a:rPr lang="en-US" smtClean="0"/>
+              <a:t>4</a:t>
+            </a:fld>
+            <a:endParaRPr lang="en-US"/>
+          </a:p>
+        </p:txBody>
+      </p:sp>
+    </p:spTree>
+    <p:extLst>
+      <p:ext uri="{BB962C8B-B14F-4D97-AF65-F5344CB8AC3E}">
+        <p14:creationId xmlns:p14="http://schemas.microsoft.com/office/powerpoint/2010/main" val="3452026943"/>
+      </p:ext>
+    </p:extLst>
+  </p:cSld>
+  <p:clrMapOvr>
+    <a:masterClrMapping/>
+  </p:clrMapOvr>
+</p:notes>
+</file>
+
+<file path=ppt/notesSlides/notesSlide5.xml><?xml version="1.0" encoding="utf-8"?>
+<p:notes xmlns:a="http://schemas.openxmlformats.org/drawingml/2006/main" xmlns:r="http://schemas.openxmlformats.org/officeDocument/2006/relationships" xmlns:p="http://schemas.openxmlformats.org/presentationml/2006/main">
+  <p:cSld>
+    <p:spTree>
+      <p:nvGrpSpPr>
+        <p:cNvPr id="1" name=""/>
+        <p:cNvGrpSpPr/>
+        <p:nvPr/>
+      </p:nvGrpSpPr>
+      <p:grpSpPr>
+        <a:xfrm>
+          <a:off x="0" y="0"/>
+          <a:ext cx="0" cy="0"/>
+          <a:chOff x="0" y="0"/>
+          <a:chExt cx="0" cy="0"/>
+        </a:xfrm>
+      </p:grpSpPr>
+      <p:sp>
+        <p:nvSpPr>
+          <p:cNvPr id="2" name="Slide Image Placeholder 1"/>
+          <p:cNvSpPr>
+            <a:spLocks noGrp="1" noRot="1" noChangeAspect="1"/>
+          </p:cNvSpPr>
+          <p:nvPr>
+            <p:ph type="sldImg"/>
+          </p:nvPr>
+        </p:nvSpPr>
+        <p:spPr/>
+      </p:sp>
+      <p:sp>
+        <p:nvSpPr>
+          <p:cNvPr id="3" name="Notes Placeholder 2"/>
+          <p:cNvSpPr>
+            <a:spLocks noGrp="1"/>
+          </p:cNvSpPr>
+          <p:nvPr>
+            <p:ph type="body" idx="1"/>
+          </p:nvPr>
+        </p:nvSpPr>
+        <p:spPr/>
+        <p:txBody>
+          <a:bodyPr/>
+          <a:lstStyle/>
+          <a:p>
+            <a:r>
+              <a:rPr lang="en-US" sz="1800" kern="0" dirty="0">
+                <a:effectLst/>
+                <a:latin typeface="Times New Roman" panose="02020603050405020304" pitchFamily="18" charset="0"/>
+                <a:ea typeface="Times New Roman" panose="02020603050405020304" pitchFamily="18" charset="0"/>
+              </a:rPr>
+              <a:t>My analysis identified overtime as the strongest predictor of attrition. Employees who work overtime have a 31.7% attrition rate, compared to just 9.7% for those who don't. This means overtime employees are 3.3 times more likely to leave the company, making this a critical focus area for retention efforts.</a:t>
+            </a:r>
+            <a:r>
+              <a:rPr lang="en-US" dirty="0">
+                <a:effectLst/>
+              </a:rPr>
+              <a:t> </a:t>
+            </a:r>
+            <a:endParaRPr lang="en-US" dirty="0"/>
+          </a:p>
+        </p:txBody>
+      </p:sp>
+      <p:sp>
+        <p:nvSpPr>
+          <p:cNvPr id="4" name="Slide Number Placeholder 3"/>
+          <p:cNvSpPr>
+            <a:spLocks noGrp="1"/>
+          </p:cNvSpPr>
+          <p:nvPr>
+            <p:ph type="sldNum" sz="quarter" idx="5"/>
+          </p:nvPr>
+        </p:nvSpPr>
+        <p:spPr/>
+        <p:txBody>
+          <a:bodyPr/>
+          <a:lstStyle/>
+          <a:p>
+            <a:fld id="{652A5D94-0C48-8048-BC64-3851A8530D1C}" type="slidenum">
+              <a:rPr lang="en-US" smtClean="0"/>
+              <a:t>5</a:t>
+            </a:fld>
+            <a:endParaRPr lang="en-US"/>
+          </a:p>
+        </p:txBody>
+      </p:sp>
+    </p:spTree>
+    <p:extLst>
+      <p:ext uri="{BB962C8B-B14F-4D97-AF65-F5344CB8AC3E}">
+        <p14:creationId xmlns:p14="http://schemas.microsoft.com/office/powerpoint/2010/main" val="3144927492"/>
+      </p:ext>
+    </p:extLst>
+  </p:cSld>
+  <p:clrMapOvr>
+    <a:masterClrMapping/>
+  </p:clrMapOvr>
+</p:notes>
+</file>
+
+<file path=ppt/notesSlides/notesSlide6.xml><?xml version="1.0" encoding="utf-8"?>
+<p:notes xmlns:a="http://schemas.openxmlformats.org/drawingml/2006/main" xmlns:r="http://schemas.openxmlformats.org/officeDocument/2006/relationships" xmlns:p="http://schemas.openxmlformats.org/presentationml/2006/main">
+  <p:cSld>
+    <p:spTree>
+      <p:nvGrpSpPr>
+        <p:cNvPr id="1" name=""/>
+        <p:cNvGrpSpPr/>
+        <p:nvPr/>
+      </p:nvGrpSpPr>
+      <p:grpSpPr>
+        <a:xfrm>
+          <a:off x="0" y="0"/>
+          <a:ext cx="0" cy="0"/>
+          <a:chOff x="0" y="0"/>
+          <a:chExt cx="0" cy="0"/>
+        </a:xfrm>
+      </p:grpSpPr>
+      <p:sp>
+        <p:nvSpPr>
+          <p:cNvPr id="2" name="Slide Image Placeholder 1"/>
+          <p:cNvSpPr>
+            <a:spLocks noGrp="1" noRot="1" noChangeAspect="1"/>
+          </p:cNvSpPr>
+          <p:nvPr>
+            <p:ph type="sldImg"/>
+          </p:nvPr>
+        </p:nvSpPr>
+        <p:spPr/>
+      </p:sp>
+      <p:sp>
+        <p:nvSpPr>
+          <p:cNvPr id="3" name="Notes Placeholder 2"/>
+          <p:cNvSpPr>
+            <a:spLocks noGrp="1"/>
+          </p:cNvSpPr>
+          <p:nvPr>
+            <p:ph type="body" idx="1"/>
+          </p:nvPr>
+        </p:nvSpPr>
+        <p:spPr/>
+        <p:txBody>
+          <a:bodyPr/>
+          <a:lstStyle/>
+          <a:p>
+            <a:r>
+              <a:rPr lang="en-US" sz="1800" kern="0" dirty="0">
+                <a:effectLst/>
+                <a:latin typeface="Times New Roman" panose="02020603050405020304" pitchFamily="18" charset="0"/>
+                <a:ea typeface="Times New Roman" panose="02020603050405020304" pitchFamily="18" charset="0"/>
+              </a:rPr>
+              <a:t>The second key factor is professional experience. Employees with fewer total working years are significantly more likely to leave the company. There's a negative correlation of -0.167 between working years and attrition. As you can see in these charts, this pattern holds true for years at the company and years since last promotion as well</a:t>
+            </a:r>
+            <a:r>
+              <a:rPr lang="en-US" dirty="0">
+                <a:effectLst/>
+              </a:rPr>
+              <a:t> </a:t>
+            </a:r>
+            <a:endParaRPr lang="en-US" dirty="0"/>
+          </a:p>
+        </p:txBody>
+      </p:sp>
+      <p:sp>
+        <p:nvSpPr>
+          <p:cNvPr id="4" name="Slide Number Placeholder 3"/>
+          <p:cNvSpPr>
+            <a:spLocks noGrp="1"/>
+          </p:cNvSpPr>
+          <p:nvPr>
+            <p:ph type="sldNum" sz="quarter" idx="5"/>
+          </p:nvPr>
+        </p:nvSpPr>
+        <p:spPr/>
+        <p:txBody>
+          <a:bodyPr/>
+          <a:lstStyle/>
+          <a:p>
+            <a:fld id="{652A5D94-0C48-8048-BC64-3851A8530D1C}" type="slidenum">
+              <a:rPr lang="en-US" smtClean="0"/>
+              <a:t>6</a:t>
+            </a:fld>
+            <a:endParaRPr lang="en-US"/>
+          </a:p>
+        </p:txBody>
+      </p:sp>
+    </p:spTree>
+    <p:extLst>
+      <p:ext uri="{BB962C8B-B14F-4D97-AF65-F5344CB8AC3E}">
+        <p14:creationId xmlns:p14="http://schemas.microsoft.com/office/powerpoint/2010/main" val="1768906757"/>
+      </p:ext>
+    </p:extLst>
+  </p:cSld>
+  <p:clrMapOvr>
+    <a:masterClrMapping/>
+  </p:clrMapOvr>
+</p:notes>
+</file>
+
+<file path=ppt/notesSlides/notesSlide7.xml><?xml version="1.0" encoding="utf-8"?>
+<p:notes xmlns:a="http://schemas.openxmlformats.org/drawingml/2006/main" xmlns:r="http://schemas.openxmlformats.org/officeDocument/2006/relationships" xmlns:p="http://schemas.openxmlformats.org/presentationml/2006/main">
+  <p:cSld>
+    <p:spTree>
+      <p:nvGrpSpPr>
+        <p:cNvPr id="1" name=""/>
+        <p:cNvGrpSpPr/>
+        <p:nvPr/>
+      </p:nvGrpSpPr>
+      <p:grpSpPr>
+        <a:xfrm>
+          <a:off x="0" y="0"/>
+          <a:ext cx="0" cy="0"/>
+          <a:chOff x="0" y="0"/>
+          <a:chExt cx="0" cy="0"/>
+        </a:xfrm>
+      </p:grpSpPr>
+      <p:sp>
+        <p:nvSpPr>
+          <p:cNvPr id="2" name="Slide Image Placeholder 1"/>
+          <p:cNvSpPr>
+            <a:spLocks noGrp="1" noRot="1" noChangeAspect="1"/>
+          </p:cNvSpPr>
+          <p:nvPr>
+            <p:ph type="sldImg"/>
+          </p:nvPr>
+        </p:nvSpPr>
+        <p:spPr/>
+      </p:sp>
+      <p:sp>
+        <p:nvSpPr>
+          <p:cNvPr id="3" name="Notes Placeholder 2"/>
+          <p:cNvSpPr>
+            <a:spLocks noGrp="1"/>
+          </p:cNvSpPr>
+          <p:nvPr>
+            <p:ph type="body" idx="1"/>
+          </p:nvPr>
+        </p:nvSpPr>
+        <p:spPr/>
+        <p:txBody>
+          <a:bodyPr/>
+          <a:lstStyle/>
+          <a:p>
+            <a:pPr marL="0" marR="0" lvl="0" indent="0" algn="l" defTabSz="914400" rtl="0" eaLnBrk="1" fontAlgn="auto" latinLnBrk="0" hangingPunct="1">
+              <a:lnSpc>
+                <a:spcPct val="100000"/>
+              </a:lnSpc>
+              <a:spcBef>
+                <a:spcPts val="0"/>
+              </a:spcBef>
+              <a:spcAft>
+                <a:spcPts val="0"/>
+              </a:spcAft>
+              <a:buClrTx/>
+              <a:buSzTx/>
+              <a:buFontTx/>
+              <a:buNone/>
+              <a:tabLst/>
+              <a:defRPr/>
+            </a:pPr>
+            <a:r>
+              <a:rPr lang="en-US" sz="1800" kern="0" dirty="0">
+                <a:effectLst/>
+                <a:latin typeface="Times New Roman" panose="02020603050405020304" pitchFamily="18" charset="0"/>
+                <a:ea typeface="Times New Roman" panose="02020603050405020304" pitchFamily="18" charset="0"/>
+                <a:cs typeface="Times New Roman" panose="02020603050405020304" pitchFamily="18" charset="0"/>
+              </a:rPr>
+              <a:t>Job level and income show strong relationships with attrition. Entry-level positions have a 26.1% attrition rate, compared to 5-10% for higher levels. Monthly income shows a negative correlation with attrition at -0.155. Looking at job roles, Sales Representatives have the highest attrition at 45.3%, while directors have the lowest at around 2%.</a:t>
+            </a:r>
+            <a:endParaRPr lang="en-US" sz="1800" kern="100" dirty="0">
+              <a:effectLst/>
+              <a:latin typeface="Aptos" panose="020B0004020202020204" pitchFamily="34" charset="0"/>
+              <a:ea typeface="Aptos" panose="020B0004020202020204" pitchFamily="34" charset="0"/>
+              <a:cs typeface="Times New Roman" panose="02020603050405020304" pitchFamily="18" charset="0"/>
+            </a:endParaRPr>
+          </a:p>
+          <a:p>
+            <a:endParaRPr lang="en-US" dirty="0"/>
+          </a:p>
+        </p:txBody>
+      </p:sp>
+      <p:sp>
+        <p:nvSpPr>
+          <p:cNvPr id="4" name="Slide Number Placeholder 3"/>
+          <p:cNvSpPr>
+            <a:spLocks noGrp="1"/>
+          </p:cNvSpPr>
+          <p:nvPr>
+            <p:ph type="sldNum" sz="quarter" idx="5"/>
+          </p:nvPr>
+        </p:nvSpPr>
+        <p:spPr/>
+        <p:txBody>
+          <a:bodyPr/>
+          <a:lstStyle/>
+          <a:p>
+            <a:fld id="{652A5D94-0C48-8048-BC64-3851A8530D1C}" type="slidenum">
+              <a:rPr lang="en-US" smtClean="0"/>
+              <a:t>7</a:t>
+            </a:fld>
+            <a:endParaRPr lang="en-US"/>
+          </a:p>
+        </p:txBody>
+      </p:sp>
+    </p:spTree>
+    <p:extLst>
+      <p:ext uri="{BB962C8B-B14F-4D97-AF65-F5344CB8AC3E}">
+        <p14:creationId xmlns:p14="http://schemas.microsoft.com/office/powerpoint/2010/main" val="1662703000"/>
+      </p:ext>
+    </p:extLst>
+  </p:cSld>
+  <p:clrMapOvr>
+    <a:masterClrMapping/>
+  </p:clrMapOvr>
+</p:notes>
+</file>
+
+<file path=ppt/notesSlides/notesSlide8.xml><?xml version="1.0" encoding="utf-8"?>
+<p:notes xmlns:a="http://schemas.openxmlformats.org/drawingml/2006/main" xmlns:r="http://schemas.openxmlformats.org/officeDocument/2006/relationships" xmlns:p="http://schemas.openxmlformats.org/presentationml/2006/main">
+  <p:cSld>
+    <p:spTree>
+      <p:nvGrpSpPr>
+        <p:cNvPr id="1" name=""/>
+        <p:cNvGrpSpPr/>
+        <p:nvPr/>
+      </p:nvGrpSpPr>
+      <p:grpSpPr>
+        <a:xfrm>
+          <a:off x="0" y="0"/>
+          <a:ext cx="0" cy="0"/>
+          <a:chOff x="0" y="0"/>
+          <a:chExt cx="0" cy="0"/>
+        </a:xfrm>
+      </p:grpSpPr>
+      <p:sp>
+        <p:nvSpPr>
+          <p:cNvPr id="2" name="Slide Image Placeholder 1"/>
+          <p:cNvSpPr>
+            <a:spLocks noGrp="1" noRot="1" noChangeAspect="1"/>
+          </p:cNvSpPr>
+          <p:nvPr>
+            <p:ph type="sldImg"/>
+          </p:nvPr>
+        </p:nvSpPr>
+        <p:spPr/>
+      </p:sp>
+      <p:sp>
+        <p:nvSpPr>
+          <p:cNvPr id="3" name="Notes Placeholder 2"/>
+          <p:cNvSpPr>
+            <a:spLocks noGrp="1"/>
+          </p:cNvSpPr>
+          <p:nvPr>
+            <p:ph type="body" idx="1"/>
+          </p:nvPr>
+        </p:nvSpPr>
+        <p:spPr/>
+        <p:txBody>
+          <a:bodyPr/>
+          <a:lstStyle/>
+          <a:p>
+            <a:r>
+              <a:rPr lang="en-US" sz="1800" kern="0" dirty="0">
+                <a:effectLst/>
+                <a:latin typeface="Times New Roman" panose="02020603050405020304" pitchFamily="18" charset="0"/>
+                <a:ea typeface="Times New Roman" panose="02020603050405020304" pitchFamily="18" charset="0"/>
+              </a:rPr>
+              <a:t>I've also identified several other notable patterns. Marital status influences attrition, with single employees showing higher rates. Work-life balance is critical, with poor balance significantly increasing attrition risk. These additional factors will help inform our final model development.</a:t>
+            </a:r>
+            <a:r>
+              <a:rPr lang="en-US" dirty="0">
+                <a:effectLst/>
+              </a:rPr>
+              <a:t> </a:t>
+            </a:r>
+            <a:endParaRPr lang="en-US" dirty="0"/>
+          </a:p>
+        </p:txBody>
+      </p:sp>
+      <p:sp>
+        <p:nvSpPr>
+          <p:cNvPr id="4" name="Slide Number Placeholder 3"/>
+          <p:cNvSpPr>
+            <a:spLocks noGrp="1"/>
+          </p:cNvSpPr>
+          <p:nvPr>
+            <p:ph type="sldNum" sz="quarter" idx="5"/>
+          </p:nvPr>
+        </p:nvSpPr>
+        <p:spPr/>
+        <p:txBody>
+          <a:bodyPr/>
+          <a:lstStyle/>
+          <a:p>
+            <a:fld id="{652A5D94-0C48-8048-BC64-3851A8530D1C}" type="slidenum">
+              <a:rPr lang="en-US" smtClean="0"/>
+              <a:t>8</a:t>
+            </a:fld>
+            <a:endParaRPr lang="en-US"/>
+          </a:p>
+        </p:txBody>
+      </p:sp>
+    </p:spTree>
+    <p:extLst>
+      <p:ext uri="{BB962C8B-B14F-4D97-AF65-F5344CB8AC3E}">
+        <p14:creationId xmlns:p14="http://schemas.microsoft.com/office/powerpoint/2010/main" val="1411904077"/>
+      </p:ext>
+    </p:extLst>
+  </p:cSld>
+  <p:clrMapOvr>
+    <a:masterClrMapping/>
+  </p:clrMapOvr>
+</p:notes>
+</file>
+
+<file path=ppt/notesSlides/notesSlide9.xml><?xml version="1.0" encoding="utf-8"?>
+<p:notes xmlns:a="http://schemas.openxmlformats.org/drawingml/2006/main" xmlns:r="http://schemas.openxmlformats.org/officeDocument/2006/relationships" xmlns:p="http://schemas.openxmlformats.org/presentationml/2006/main">
+  <p:cSld>
+    <p:spTree>
+      <p:nvGrpSpPr>
+        <p:cNvPr id="1" name=""/>
+        <p:cNvGrpSpPr/>
+        <p:nvPr/>
+      </p:nvGrpSpPr>
+      <p:grpSpPr>
+        <a:xfrm>
+          <a:off x="0" y="0"/>
+          <a:ext cx="0" cy="0"/>
+          <a:chOff x="0" y="0"/>
+          <a:chExt cx="0" cy="0"/>
+        </a:xfrm>
+      </p:grpSpPr>
+      <p:sp>
+        <p:nvSpPr>
+          <p:cNvPr id="2" name="Slide Image Placeholder 1"/>
+          <p:cNvSpPr>
+            <a:spLocks noGrp="1" noRot="1" noChangeAspect="1"/>
+          </p:cNvSpPr>
+          <p:nvPr>
+            <p:ph type="sldImg"/>
+          </p:nvPr>
+        </p:nvSpPr>
+        <p:spPr/>
+      </p:sp>
+      <p:sp>
+        <p:nvSpPr>
+          <p:cNvPr id="3" name="Notes Placeholder 2"/>
+          <p:cNvSpPr>
+            <a:spLocks noGrp="1"/>
+          </p:cNvSpPr>
+          <p:nvPr>
+            <p:ph type="body" idx="1"/>
+          </p:nvPr>
+        </p:nvSpPr>
+        <p:spPr/>
+        <p:txBody>
+          <a:bodyPr/>
+          <a:lstStyle/>
+          <a:p>
+            <a:r>
+              <a:rPr lang="en-US" sz="1800" kern="0" dirty="0">
+                <a:effectLst/>
+                <a:latin typeface="Times New Roman" panose="02020603050405020304" pitchFamily="18" charset="0"/>
+                <a:ea typeface="Times New Roman" panose="02020603050405020304" pitchFamily="18" charset="0"/>
+              </a:rPr>
+              <a:t>For my initial modeling, I've prepared the data using a train/test split and begun exploring KNN and Naive Bayes algorithms. Both models show promise but need further refinement to reach our target of 60% sensitivity and specificity. The Naive Bayes model is currently performing better with 58% sensitivity and 65% specificity.</a:t>
+            </a:r>
+            <a:r>
+              <a:rPr lang="en-US" dirty="0">
+                <a:effectLst/>
+              </a:rPr>
+              <a:t> </a:t>
+            </a:r>
+            <a:endParaRPr lang="en-US" dirty="0"/>
+          </a:p>
+        </p:txBody>
+      </p:sp>
+      <p:sp>
+        <p:nvSpPr>
+          <p:cNvPr id="4" name="Slide Number Placeholder 3"/>
+          <p:cNvSpPr>
+            <a:spLocks noGrp="1"/>
+          </p:cNvSpPr>
+          <p:nvPr>
+            <p:ph type="sldNum" sz="quarter" idx="5"/>
+          </p:nvPr>
+        </p:nvSpPr>
+        <p:spPr/>
+        <p:txBody>
+          <a:bodyPr/>
+          <a:lstStyle/>
+          <a:p>
+            <a:fld id="{652A5D94-0C48-8048-BC64-3851A8530D1C}" type="slidenum">
+              <a:rPr lang="en-US" smtClean="0"/>
+              <a:t>9</a:t>
+            </a:fld>
+            <a:endParaRPr lang="en-US"/>
+          </a:p>
+        </p:txBody>
+      </p:sp>
+    </p:spTree>
+    <p:extLst>
+      <p:ext uri="{BB962C8B-B14F-4D97-AF65-F5344CB8AC3E}">
+        <p14:creationId xmlns:p14="http://schemas.microsoft.com/office/powerpoint/2010/main" val="708404397"/>
+      </p:ext>
+    </p:extLst>
+  </p:cSld>
+  <p:clrMapOvr>
+    <a:masterClrMapping/>
+  </p:clrMapOvr>
+</p:notes>
+</file>
+
 <file path=ppt/slideLayouts/slideLayout1.xml><?xml version="1.0" encoding="utf-8"?>
 <p:sldLayout xmlns:a="http://schemas.openxmlformats.org/drawingml/2006/main" xmlns:r="http://schemas.openxmlformats.org/officeDocument/2006/relationships" xmlns:p="http://schemas.openxmlformats.org/presentationml/2006/main" type="title" preserve="1">
   <p:cSld name="Title Slide">
@@ -48389,7 +49863,7 @@
           <a:p>
             <a:fld id="{6444479B-705B-4489-957E-7E8A228BDFA0}" type="datetime1">
               <a:rPr lang="en-US" smtClean="0"/>
-              <a:t>3/8/25</a:t>
+              <a:t>3/10/25</a:t>
             </a:fld>
             <a:endParaRPr lang="en-US"/>
           </a:p>
@@ -48589,7 +50063,7 @@
           <a:p>
             <a:fld id="{C07B66AD-7C08-490A-ADA4-B47E10FB2407}" type="datetime1">
               <a:rPr lang="en-US" smtClean="0"/>
-              <a:t>3/8/25</a:t>
+              <a:t>3/10/25</a:t>
             </a:fld>
             <a:endParaRPr lang="en-US"/>
           </a:p>
@@ -48848,7 +50322,7 @@
           <a:p>
             <a:fld id="{05B95027-4255-49E7-9841-CD21BCC99996}" type="datetime1">
               <a:rPr lang="en-US" smtClean="0"/>
-              <a:t>3/8/25</a:t>
+              <a:t>3/10/25</a:t>
             </a:fld>
             <a:endParaRPr lang="en-US"/>
           </a:p>
@@ -49089,7 +50563,7 @@
           <a:p>
             <a:fld id="{9F89F774-3FA6-43B8-9241-99959C8FD463}" type="datetime1">
               <a:rPr lang="en-US" smtClean="0"/>
-              <a:t>3/8/25</a:t>
+              <a:t>3/10/25</a:t>
             </a:fld>
             <a:endParaRPr lang="en-US"/>
           </a:p>
@@ -49416,7 +50890,7 @@
           <a:p>
             <a:fld id="{F9504452-5DCC-4FE2-A5C9-8A5EF6714D65}" type="datetime1">
               <a:rPr lang="en-US" smtClean="0"/>
-              <a:t>3/8/25</a:t>
+              <a:t>3/10/25</a:t>
             </a:fld>
             <a:endParaRPr lang="en-US"/>
           </a:p>
@@ -49726,7 +51200,7 @@
           <a:p>
             <a:fld id="{E579ABC2-0180-4F3A-A895-A85BC724D472}" type="datetime1">
               <a:rPr lang="en-US" smtClean="0"/>
-              <a:t>3/8/25</a:t>
+              <a:t>3/10/25</a:t>
             </a:fld>
             <a:endParaRPr lang="en-US"/>
           </a:p>
@@ -50144,7 +51618,7 @@
           <a:p>
             <a:fld id="{6AEEA9BA-4E8F-439E-BEA4-91FBA01E3F5F}" type="datetime1">
               <a:rPr lang="en-US" smtClean="0"/>
-              <a:t>3/8/25</a:t>
+              <a:t>3/10/25</a:t>
             </a:fld>
             <a:endParaRPr lang="en-US"/>
           </a:p>
@@ -50286,7 +51760,7 @@
           <a:p>
             <a:fld id="{BE15BF18-0007-481C-AA29-413124BC3EE7}" type="datetime1">
               <a:rPr lang="en-US" smtClean="0"/>
-              <a:t>3/8/25</a:t>
+              <a:t>3/10/25</a:t>
             </a:fld>
             <a:endParaRPr lang="en-US"/>
           </a:p>
@@ -50448,7 +51922,7 @@
           <a:p>
             <a:fld id="{09BE9870-3748-43AD-B547-02A075CB4A1D}" type="datetime1">
               <a:rPr lang="en-US" smtClean="0"/>
-              <a:t>3/8/25</a:t>
+              <a:t>3/10/25</a:t>
             </a:fld>
             <a:endParaRPr lang="en-US"/>
           </a:p>
@@ -50765,7 +52239,7 @@
           <a:p>
             <a:fld id="{558E7897-33C5-4F1A-9307-D068E37F3DC7}" type="datetime1">
               <a:rPr lang="en-US" smtClean="0"/>
-              <a:t>3/8/25</a:t>
+              <a:t>3/10/25</a:t>
             </a:fld>
             <a:endParaRPr lang="en-US"/>
           </a:p>
@@ -51060,7 +52534,7 @@
           <a:p>
             <a:fld id="{82E171BA-CC09-47C8-A6DF-F5C5CB59CEEC}" type="datetime1">
               <a:rPr lang="en-US" smtClean="0"/>
-              <a:t>3/8/25</a:t>
+              <a:t>3/10/25</a:t>
             </a:fld>
             <a:endParaRPr lang="en-US"/>
           </a:p>
@@ -51301,7 +52775,7 @@
           <a:p>
             <a:fld id="{7DA38F49-B3E2-4BF0-BEC7-C30D34ABBB8D}" type="datetime1">
               <a:rPr lang="en-US" smtClean="0"/>
-              <a:t>3/8/25</a:t>
+              <a:t>3/10/25</a:t>
             </a:fld>
             <a:endParaRPr lang="en-US"/>
           </a:p>
@@ -51890,7 +53364,7 @@
           <p:nvPr/>
         </p:nvPicPr>
         <p:blipFill>
-          <a:blip r:embed="rId3"/>
+          <a:blip r:embed="rId4"/>
           <a:srcRect t="5817" b="9914"/>
           <a:stretch/>
         </p:blipFill>
@@ -52232,7 +53706,7 @@
           <p:nvPr/>
         </p:nvPicPr>
         <p:blipFill>
-          <a:blip r:embed="rId4"/>
+          <a:blip r:embed="rId5"/>
           <a:stretch>
             <a:fillRect/>
           </a:stretch>
@@ -52713,7 +54187,7 @@
           <p:nvPr/>
         </p:nvPicPr>
         <p:blipFill>
-          <a:blip r:embed="rId3"/>
+          <a:blip r:embed="rId4"/>
           <a:srcRect l="9912" r="42804" b="-1"/>
           <a:stretch/>
         </p:blipFill>
@@ -52799,7 +54273,7 @@
         </p:xfrm>
         <a:graphic>
           <a:graphicData uri="http://schemas.openxmlformats.org/drawingml/2006/diagram">
-            <dgm:relIds xmlns:dgm="http://schemas.openxmlformats.org/drawingml/2006/diagram" xmlns:r="http://schemas.openxmlformats.org/officeDocument/2006/relationships" r:dm="rId4" r:lo="rId5" r:qs="rId6" r:cs="rId7"/>
+            <dgm:relIds xmlns:dgm="http://schemas.openxmlformats.org/drawingml/2006/diagram" xmlns:r="http://schemas.openxmlformats.org/officeDocument/2006/relationships" r:dm="rId5" r:lo="rId6" r:qs="rId7" r:cs="rId8"/>
           </a:graphicData>
         </a:graphic>
       </p:graphicFrame>
@@ -52818,7 +54292,7 @@
           <p:nvPr/>
         </p:nvPicPr>
         <p:blipFill>
-          <a:blip r:embed="rId9"/>
+          <a:blip r:embed="rId10"/>
           <a:srcRect t="1974" r="-1" b="-1"/>
           <a:stretch/>
         </p:blipFill>
@@ -53105,7 +54579,7 @@
         </p:xfrm>
         <a:graphic>
           <a:graphicData uri="http://schemas.openxmlformats.org/drawingml/2006/diagram">
-            <dgm:relIds xmlns:dgm="http://schemas.openxmlformats.org/drawingml/2006/diagram" xmlns:r="http://schemas.openxmlformats.org/officeDocument/2006/relationships" r:dm="rId10" r:lo="rId11" r:qs="rId12" r:cs="rId13"/>
+            <dgm:relIds xmlns:dgm="http://schemas.openxmlformats.org/drawingml/2006/diagram" xmlns:r="http://schemas.openxmlformats.org/officeDocument/2006/relationships" r:dm="rId11" r:lo="rId12" r:qs="rId13" r:cs="rId14"/>
           </a:graphicData>
         </a:graphic>
       </p:graphicFrame>
@@ -53431,7 +54905,7 @@
           <p:nvPr/>
         </p:nvPicPr>
         <p:blipFill>
-          <a:blip r:embed="rId3"/>
+          <a:blip r:embed="rId4"/>
           <a:srcRect l="9912" r="42804" b="-1"/>
           <a:stretch/>
         </p:blipFill>
@@ -53572,7 +55046,7 @@
             </a:r>
             <a:r>
               <a:rPr lang="en-US" sz="2000" dirty="0">
-                <a:hlinkClick r:id="rId4"/>
+                <a:hlinkClick r:id="rId5"/>
               </a:rPr>
               <a:t>jarocha@smu.edu</a:t>
             </a:r>
@@ -53610,7 +55084,7 @@
             </a:r>
             <a:r>
               <a:rPr lang="en-US" sz="2000" dirty="0">
-                <a:hlinkClick r:id="rId5"/>
+                <a:hlinkClick r:id="rId6"/>
               </a:rPr>
               <a:t>https://github.com/jonx0037/ds6306-project</a:t>
             </a:r>
@@ -53636,7 +55110,7 @@
           <p:nvPr/>
         </p:nvPicPr>
         <p:blipFill>
-          <a:blip r:embed="rId6"/>
+          <a:blip r:embed="rId7"/>
           <a:srcRect t="1974" r="-1" b="-1"/>
           <a:stretch/>
         </p:blipFill>
@@ -54115,7 +55589,7 @@
           <p:nvPr/>
         </p:nvPicPr>
         <p:blipFill>
-          <a:blip r:embed="rId3"/>
+          <a:blip r:embed="rId4"/>
           <a:srcRect l="9912" r="42804" b="-1"/>
           <a:stretch/>
         </p:blipFill>
@@ -54201,7 +55675,7 @@
         </p:xfrm>
         <a:graphic>
           <a:graphicData uri="http://schemas.openxmlformats.org/drawingml/2006/diagram">
-            <dgm:relIds xmlns:dgm="http://schemas.openxmlformats.org/drawingml/2006/diagram" xmlns:r="http://schemas.openxmlformats.org/officeDocument/2006/relationships" r:dm="rId4" r:lo="rId5" r:qs="rId6" r:cs="rId7"/>
+            <dgm:relIds xmlns:dgm="http://schemas.openxmlformats.org/drawingml/2006/diagram" xmlns:r="http://schemas.openxmlformats.org/officeDocument/2006/relationships" r:dm="rId5" r:lo="rId6" r:qs="rId7" r:cs="rId8"/>
           </a:graphicData>
         </a:graphic>
       </p:graphicFrame>
@@ -54229,7 +55703,7 @@
         </p:xfrm>
         <a:graphic>
           <a:graphicData uri="http://schemas.openxmlformats.org/drawingml/2006/diagram">
-            <dgm:relIds xmlns:dgm="http://schemas.openxmlformats.org/drawingml/2006/diagram" xmlns:r="http://schemas.openxmlformats.org/officeDocument/2006/relationships" r:dm="rId9" r:lo="rId10" r:qs="rId11" r:cs="rId12"/>
+            <dgm:relIds xmlns:dgm="http://schemas.openxmlformats.org/drawingml/2006/diagram" xmlns:r="http://schemas.openxmlformats.org/officeDocument/2006/relationships" r:dm="rId10" r:lo="rId11" r:qs="rId12" r:cs="rId13"/>
           </a:graphicData>
         </a:graphic>
       </p:graphicFrame>
@@ -54248,7 +55722,7 @@
           <p:nvPr/>
         </p:nvPicPr>
         <p:blipFill>
-          <a:blip r:embed="rId14"/>
+          <a:blip r:embed="rId15"/>
           <a:srcRect t="1974" r="-1" b="-1"/>
           <a:stretch/>
         </p:blipFill>
@@ -54581,7 +56055,7 @@
           <p:nvPr/>
         </p:nvPicPr>
         <p:blipFill>
-          <a:blip r:embed="rId3"/>
+          <a:blip r:embed="rId4"/>
           <a:srcRect t="9180" b="6551"/>
           <a:stretch/>
         </p:blipFill>
@@ -54830,7 +56304,7 @@
           <p:nvPr/>
         </p:nvPicPr>
         <p:blipFill>
-          <a:blip r:embed="rId4"/>
+          <a:blip r:embed="rId5"/>
           <a:stretch>
             <a:fillRect/>
           </a:stretch>
@@ -54860,7 +56334,7 @@
           <p:nvPr/>
         </p:nvPicPr>
         <p:blipFill>
-          <a:blip r:embed="rId5"/>
+          <a:blip r:embed="rId6"/>
           <a:stretch>
             <a:fillRect/>
           </a:stretch>
@@ -55303,7 +56777,7 @@
           <p:nvPr/>
         </p:nvPicPr>
         <p:blipFill>
-          <a:blip r:embed="rId3"/>
+          <a:blip r:embed="rId4"/>
           <a:srcRect t="7865" b="7865"/>
           <a:stretch/>
         </p:blipFill>
@@ -55347,7 +56821,7 @@
         </p:xfrm>
         <a:graphic>
           <a:graphicData uri="http://schemas.openxmlformats.org/drawingml/2006/diagram">
-            <dgm:relIds xmlns:dgm="http://schemas.openxmlformats.org/drawingml/2006/diagram" xmlns:r="http://schemas.openxmlformats.org/officeDocument/2006/relationships" r:dm="rId4" r:lo="rId5" r:qs="rId6" r:cs="rId7"/>
+            <dgm:relIds xmlns:dgm="http://schemas.openxmlformats.org/drawingml/2006/diagram" xmlns:r="http://schemas.openxmlformats.org/officeDocument/2006/relationships" r:dm="rId5" r:lo="rId6" r:qs="rId7" r:cs="rId8"/>
           </a:graphicData>
         </a:graphic>
       </p:graphicFrame>
@@ -55375,7 +56849,7 @@
         </p:xfrm>
         <a:graphic>
           <a:graphicData uri="http://schemas.openxmlformats.org/drawingml/2006/diagram">
-            <dgm:relIds xmlns:dgm="http://schemas.openxmlformats.org/drawingml/2006/diagram" xmlns:r="http://schemas.openxmlformats.org/officeDocument/2006/relationships" r:dm="rId9" r:lo="rId10" r:qs="rId11" r:cs="rId12"/>
+            <dgm:relIds xmlns:dgm="http://schemas.openxmlformats.org/drawingml/2006/diagram" xmlns:r="http://schemas.openxmlformats.org/officeDocument/2006/relationships" r:dm="rId10" r:lo="rId11" r:qs="rId12" r:cs="rId13"/>
           </a:graphicData>
         </a:graphic>
       </p:graphicFrame>
@@ -55394,7 +56868,7 @@
           <p:nvPr/>
         </p:nvPicPr>
         <p:blipFill>
-          <a:blip r:embed="rId14"/>
+          <a:blip r:embed="rId15"/>
           <a:srcRect t="1974" r="-1" b="-1"/>
           <a:stretch/>
         </p:blipFill>
@@ -55606,7 +57080,7 @@
           <p:nvPr/>
         </p:nvPicPr>
         <p:blipFill>
-          <a:blip r:embed="rId3"/>
+          <a:blip r:embed="rId4"/>
           <a:srcRect l="9912" r="42804" b="-1"/>
           <a:stretch/>
         </p:blipFill>
@@ -55644,7 +57118,7 @@
         </p:xfrm>
         <a:graphic>
           <a:graphicData uri="http://schemas.openxmlformats.org/drawingml/2006/diagram">
-            <dgm:relIds xmlns:dgm="http://schemas.openxmlformats.org/drawingml/2006/diagram" xmlns:r="http://schemas.openxmlformats.org/officeDocument/2006/relationships" r:dm="rId4" r:lo="rId5" r:qs="rId6" r:cs="rId7"/>
+            <dgm:relIds xmlns:dgm="http://schemas.openxmlformats.org/drawingml/2006/diagram" xmlns:r="http://schemas.openxmlformats.org/officeDocument/2006/relationships" r:dm="rId5" r:lo="rId6" r:qs="rId7" r:cs="rId8"/>
           </a:graphicData>
         </a:graphic>
       </p:graphicFrame>
@@ -55672,7 +57146,7 @@
         </p:xfrm>
         <a:graphic>
           <a:graphicData uri="http://schemas.openxmlformats.org/drawingml/2006/diagram">
-            <dgm:relIds xmlns:dgm="http://schemas.openxmlformats.org/drawingml/2006/diagram" xmlns:r="http://schemas.openxmlformats.org/officeDocument/2006/relationships" r:dm="rId9" r:lo="rId10" r:qs="rId11" r:cs="rId12"/>
+            <dgm:relIds xmlns:dgm="http://schemas.openxmlformats.org/drawingml/2006/diagram" xmlns:r="http://schemas.openxmlformats.org/officeDocument/2006/relationships" r:dm="rId10" r:lo="rId11" r:qs="rId12" r:cs="rId13"/>
           </a:graphicData>
         </a:graphic>
       </p:graphicFrame>
@@ -55700,7 +57174,7 @@
         </p:xfrm>
         <a:graphic>
           <a:graphicData uri="http://schemas.openxmlformats.org/drawingml/2006/diagram">
-            <dgm:relIds xmlns:dgm="http://schemas.openxmlformats.org/drawingml/2006/diagram" xmlns:r="http://schemas.openxmlformats.org/officeDocument/2006/relationships" r:dm="rId14" r:lo="rId15" r:qs="rId16" r:cs="rId17"/>
+            <dgm:relIds xmlns:dgm="http://schemas.openxmlformats.org/drawingml/2006/diagram" xmlns:r="http://schemas.openxmlformats.org/officeDocument/2006/relationships" r:dm="rId15" r:lo="rId16" r:qs="rId17" r:cs="rId18"/>
           </a:graphicData>
         </a:graphic>
       </p:graphicFrame>
@@ -55719,7 +57193,7 @@
           <p:nvPr/>
         </p:nvPicPr>
         <p:blipFill>
-          <a:blip r:embed="rId19"/>
+          <a:blip r:embed="rId20"/>
           <a:stretch>
             <a:fillRect/>
           </a:stretch>
@@ -55749,7 +57223,7 @@
           <p:nvPr/>
         </p:nvPicPr>
         <p:blipFill>
-          <a:blip r:embed="rId20"/>
+          <a:blip r:embed="rId21"/>
           <a:stretch>
             <a:fillRect/>
           </a:stretch>
@@ -56065,7 +57539,7 @@
           <p:nvPr/>
         </p:nvPicPr>
         <p:blipFill>
-          <a:blip r:embed="rId3"/>
+          <a:blip r:embed="rId4"/>
           <a:srcRect l="9912" r="42804" b="-1"/>
           <a:stretch/>
         </p:blipFill>
@@ -56103,7 +57577,7 @@
         </p:xfrm>
         <a:graphic>
           <a:graphicData uri="http://schemas.openxmlformats.org/drawingml/2006/diagram">
-            <dgm:relIds xmlns:dgm="http://schemas.openxmlformats.org/drawingml/2006/diagram" xmlns:r="http://schemas.openxmlformats.org/officeDocument/2006/relationships" r:dm="rId4" r:lo="rId5" r:qs="rId6" r:cs="rId7"/>
+            <dgm:relIds xmlns:dgm="http://schemas.openxmlformats.org/drawingml/2006/diagram" xmlns:r="http://schemas.openxmlformats.org/officeDocument/2006/relationships" r:dm="rId5" r:lo="rId6" r:qs="rId7" r:cs="rId8"/>
           </a:graphicData>
         </a:graphic>
       </p:graphicFrame>
@@ -56131,7 +57605,7 @@
         </p:xfrm>
         <a:graphic>
           <a:graphicData uri="http://schemas.openxmlformats.org/drawingml/2006/diagram">
-            <dgm:relIds xmlns:dgm="http://schemas.openxmlformats.org/drawingml/2006/diagram" xmlns:r="http://schemas.openxmlformats.org/officeDocument/2006/relationships" r:dm="rId9" r:lo="rId10" r:qs="rId11" r:cs="rId12"/>
+            <dgm:relIds xmlns:dgm="http://schemas.openxmlformats.org/drawingml/2006/diagram" xmlns:r="http://schemas.openxmlformats.org/officeDocument/2006/relationships" r:dm="rId10" r:lo="rId11" r:qs="rId12" r:cs="rId13"/>
           </a:graphicData>
         </a:graphic>
       </p:graphicFrame>
@@ -56159,7 +57633,7 @@
         </p:xfrm>
         <a:graphic>
           <a:graphicData uri="http://schemas.openxmlformats.org/drawingml/2006/diagram">
-            <dgm:relIds xmlns:dgm="http://schemas.openxmlformats.org/drawingml/2006/diagram" xmlns:r="http://schemas.openxmlformats.org/officeDocument/2006/relationships" r:dm="rId14" r:lo="rId15" r:qs="rId16" r:cs="rId17"/>
+            <dgm:relIds xmlns:dgm="http://schemas.openxmlformats.org/drawingml/2006/diagram" xmlns:r="http://schemas.openxmlformats.org/officeDocument/2006/relationships" r:dm="rId15" r:lo="rId16" r:qs="rId17" r:cs="rId18"/>
           </a:graphicData>
         </a:graphic>
       </p:graphicFrame>
@@ -56178,7 +57652,7 @@
           <p:nvPr/>
         </p:nvPicPr>
         <p:blipFill>
-          <a:blip r:embed="rId19"/>
+          <a:blip r:embed="rId20"/>
           <a:stretch>
             <a:fillRect/>
           </a:stretch>
@@ -56208,7 +57682,7 @@
           <p:nvPr/>
         </p:nvPicPr>
         <p:blipFill>
-          <a:blip r:embed="rId20"/>
+          <a:blip r:embed="rId21"/>
           <a:stretch>
             <a:fillRect/>
           </a:stretch>
@@ -56238,7 +57712,7 @@
           <p:nvPr/>
         </p:nvPicPr>
         <p:blipFill>
-          <a:blip r:embed="rId21"/>
+          <a:blip r:embed="rId22"/>
           <a:stretch>
             <a:fillRect/>
           </a:stretch>
@@ -56607,7 +58081,7 @@
           <p:nvPr/>
         </p:nvPicPr>
         <p:blipFill>
-          <a:blip r:embed="rId3"/>
+          <a:blip r:embed="rId4"/>
           <a:srcRect l="9912" r="42804" b="-1"/>
           <a:stretch/>
         </p:blipFill>
@@ -56645,7 +58119,7 @@
         </p:xfrm>
         <a:graphic>
           <a:graphicData uri="http://schemas.openxmlformats.org/drawingml/2006/diagram">
-            <dgm:relIds xmlns:dgm="http://schemas.openxmlformats.org/drawingml/2006/diagram" xmlns:r="http://schemas.openxmlformats.org/officeDocument/2006/relationships" r:dm="rId4" r:lo="rId5" r:qs="rId6" r:cs="rId7"/>
+            <dgm:relIds xmlns:dgm="http://schemas.openxmlformats.org/drawingml/2006/diagram" xmlns:r="http://schemas.openxmlformats.org/officeDocument/2006/relationships" r:dm="rId5" r:lo="rId6" r:qs="rId7" r:cs="rId8"/>
           </a:graphicData>
         </a:graphic>
       </p:graphicFrame>
@@ -56673,7 +58147,7 @@
         </p:xfrm>
         <a:graphic>
           <a:graphicData uri="http://schemas.openxmlformats.org/drawingml/2006/diagram">
-            <dgm:relIds xmlns:dgm="http://schemas.openxmlformats.org/drawingml/2006/diagram" xmlns:r="http://schemas.openxmlformats.org/officeDocument/2006/relationships" r:dm="rId9" r:lo="rId10" r:qs="rId11" r:cs="rId12"/>
+            <dgm:relIds xmlns:dgm="http://schemas.openxmlformats.org/drawingml/2006/diagram" xmlns:r="http://schemas.openxmlformats.org/officeDocument/2006/relationships" r:dm="rId10" r:lo="rId11" r:qs="rId12" r:cs="rId13"/>
           </a:graphicData>
         </a:graphic>
       </p:graphicFrame>
@@ -56701,7 +58175,7 @@
         </p:xfrm>
         <a:graphic>
           <a:graphicData uri="http://schemas.openxmlformats.org/drawingml/2006/diagram">
-            <dgm:relIds xmlns:dgm="http://schemas.openxmlformats.org/drawingml/2006/diagram" xmlns:r="http://schemas.openxmlformats.org/officeDocument/2006/relationships" r:dm="rId14" r:lo="rId15" r:qs="rId16" r:cs="rId17"/>
+            <dgm:relIds xmlns:dgm="http://schemas.openxmlformats.org/drawingml/2006/diagram" xmlns:r="http://schemas.openxmlformats.org/officeDocument/2006/relationships" r:dm="rId15" r:lo="rId16" r:qs="rId17" r:cs="rId18"/>
           </a:graphicData>
         </a:graphic>
       </p:graphicFrame>
@@ -56720,7 +58194,7 @@
           <p:nvPr/>
         </p:nvPicPr>
         <p:blipFill>
-          <a:blip r:embed="rId19"/>
+          <a:blip r:embed="rId20"/>
           <a:stretch>
             <a:fillRect/>
           </a:stretch>
@@ -56750,7 +58224,7 @@
           <p:nvPr/>
         </p:nvPicPr>
         <p:blipFill>
-          <a:blip r:embed="rId20"/>
+          <a:blip r:embed="rId21"/>
           <a:stretch>
             <a:fillRect/>
           </a:stretch>
@@ -56780,7 +58254,7 @@
           <p:nvPr/>
         </p:nvPicPr>
         <p:blipFill>
-          <a:blip r:embed="rId21"/>
+          <a:blip r:embed="rId22"/>
           <a:stretch>
             <a:fillRect/>
           </a:stretch>
@@ -57282,7 +58756,7 @@
         </p:xfrm>
         <a:graphic>
           <a:graphicData uri="http://schemas.openxmlformats.org/drawingml/2006/diagram">
-            <dgm:relIds xmlns:dgm="http://schemas.openxmlformats.org/drawingml/2006/diagram" xmlns:r="http://schemas.openxmlformats.org/officeDocument/2006/relationships" r:dm="rId3" r:lo="rId4" r:qs="rId5" r:cs="rId6"/>
+            <dgm:relIds xmlns:dgm="http://schemas.openxmlformats.org/drawingml/2006/diagram" xmlns:r="http://schemas.openxmlformats.org/officeDocument/2006/relationships" r:dm="rId4" r:lo="rId5" r:qs="rId6" r:cs="rId7"/>
           </a:graphicData>
         </a:graphic>
       </p:graphicFrame>
@@ -57310,7 +58784,7 @@
         </p:xfrm>
         <a:graphic>
           <a:graphicData uri="http://schemas.openxmlformats.org/drawingml/2006/diagram">
-            <dgm:relIds xmlns:dgm="http://schemas.openxmlformats.org/drawingml/2006/diagram" xmlns:r="http://schemas.openxmlformats.org/officeDocument/2006/relationships" r:dm="rId8" r:lo="rId9" r:qs="rId10" r:cs="rId11"/>
+            <dgm:relIds xmlns:dgm="http://schemas.openxmlformats.org/drawingml/2006/diagram" xmlns:r="http://schemas.openxmlformats.org/officeDocument/2006/relationships" r:dm="rId9" r:lo="rId10" r:qs="rId11" r:cs="rId12"/>
           </a:graphicData>
         </a:graphic>
       </p:graphicFrame>
@@ -57377,7 +58851,7 @@
           <p:nvPr/>
         </p:nvPicPr>
         <p:blipFill>
-          <a:blip r:embed="rId13"/>
+          <a:blip r:embed="rId14"/>
           <a:srcRect l="9912" r="42804" b="-1"/>
           <a:stretch/>
         </p:blipFill>
@@ -57406,7 +58880,7 @@
           <p:nvPr/>
         </p:nvPicPr>
         <p:blipFill>
-          <a:blip r:embed="rId14"/>
+          <a:blip r:embed="rId15"/>
           <a:srcRect t="1974" r="-1" b="-1"/>
           <a:stretch/>
         </p:blipFill>
@@ -57742,7 +59216,7 @@
           <p:nvPr/>
         </p:nvPicPr>
         <p:blipFill>
-          <a:blip r:embed="rId3"/>
+          <a:blip r:embed="rId4"/>
           <a:srcRect l="9912" r="42804" b="-1"/>
           <a:stretch/>
         </p:blipFill>
@@ -57828,7 +59302,7 @@
         </p:xfrm>
         <a:graphic>
           <a:graphicData uri="http://schemas.openxmlformats.org/drawingml/2006/diagram">
-            <dgm:relIds xmlns:dgm="http://schemas.openxmlformats.org/drawingml/2006/diagram" xmlns:r="http://schemas.openxmlformats.org/officeDocument/2006/relationships" r:dm="rId4" r:lo="rId5" r:qs="rId6" r:cs="rId7"/>
+            <dgm:relIds xmlns:dgm="http://schemas.openxmlformats.org/drawingml/2006/diagram" xmlns:r="http://schemas.openxmlformats.org/officeDocument/2006/relationships" r:dm="rId5" r:lo="rId6" r:qs="rId7" r:cs="rId8"/>
           </a:graphicData>
         </a:graphic>
       </p:graphicFrame>
@@ -57856,7 +59330,7 @@
         </p:xfrm>
         <a:graphic>
           <a:graphicData uri="http://schemas.openxmlformats.org/drawingml/2006/diagram">
-            <dgm:relIds xmlns:dgm="http://schemas.openxmlformats.org/drawingml/2006/diagram" xmlns:r="http://schemas.openxmlformats.org/officeDocument/2006/relationships" r:dm="rId9" r:lo="rId10" r:qs="rId11" r:cs="rId12"/>
+            <dgm:relIds xmlns:dgm="http://schemas.openxmlformats.org/drawingml/2006/diagram" xmlns:r="http://schemas.openxmlformats.org/officeDocument/2006/relationships" r:dm="rId10" r:lo="rId11" r:qs="rId12" r:cs="rId13"/>
           </a:graphicData>
         </a:graphic>
       </p:graphicFrame>
@@ -57875,7 +59349,7 @@
           <p:nvPr/>
         </p:nvPicPr>
         <p:blipFill>
-          <a:blip r:embed="rId14"/>
+          <a:blip r:embed="rId15"/>
           <a:srcRect t="1974" r="-1" b="-1"/>
           <a:stretch/>
         </p:blipFill>
@@ -58353,4 +59827,319 @@
     </a:ext>
   </a:extLst>
 </a:theme>
+</file>
+
+<file path=ppt/theme/theme2.xml><?xml version="1.0" encoding="utf-8"?>
+<a:theme xmlns:a="http://schemas.openxmlformats.org/drawingml/2006/main" name="Office Theme">
+  <a:themeElements>
+    <a:clrScheme name="Office">
+      <a:dk1>
+        <a:sysClr val="windowText" lastClr="000000"/>
+      </a:dk1>
+      <a:lt1>
+        <a:sysClr val="window" lastClr="FFFFFF"/>
+      </a:lt1>
+      <a:dk2>
+        <a:srgbClr val="0E2841"/>
+      </a:dk2>
+      <a:lt2>
+        <a:srgbClr val="E8E8E8"/>
+      </a:lt2>
+      <a:accent1>
+        <a:srgbClr val="156082"/>
+      </a:accent1>
+      <a:accent2>
+        <a:srgbClr val="E97132"/>
+      </a:accent2>
+      <a:accent3>
+        <a:srgbClr val="196B24"/>
+      </a:accent3>
+      <a:accent4>
+        <a:srgbClr val="0F9ED5"/>
+      </a:accent4>
+      <a:accent5>
+        <a:srgbClr val="A02B93"/>
+      </a:accent5>
+      <a:accent6>
+        <a:srgbClr val="4EA72E"/>
+      </a:accent6>
+      <a:hlink>
+        <a:srgbClr val="467886"/>
+      </a:hlink>
+      <a:folHlink>
+        <a:srgbClr val="96607D"/>
+      </a:folHlink>
+    </a:clrScheme>
+    <a:fontScheme name="Office">
+      <a:majorFont>
+        <a:latin typeface="Aptos Display" panose="02110004020202020204"/>
+        <a:ea typeface=""/>
+        <a:cs typeface=""/>
+        <a:font script="Jpan" typeface="游ゴシック Light"/>
+        <a:font script="Hang" typeface="맑은 고딕"/>
+        <a:font script="Hans" typeface="等线 Light"/>
+        <a:font script="Hant" typeface="新細明體"/>
+        <a:font script="Arab" typeface="Times New Roman"/>
+        <a:font script="Hebr" typeface="Times New Roman"/>
+        <a:font script="Thai" typeface="Angsana New"/>
+        <a:font script="Ethi" typeface="Nyala"/>
+        <a:font script="Beng" typeface="Vrinda"/>
+        <a:font script="Gujr" typeface="Shruti"/>
+        <a:font script="Khmr" typeface="MoolBoran"/>
+        <a:font script="Knda" typeface="Tunga"/>
+        <a:font script="Guru" typeface="Raavi"/>
+        <a:font script="Cans" typeface="Euphemia"/>
+        <a:font script="Cher" typeface="Plantagenet Cherokee"/>
+        <a:font script="Yiii" typeface="Microsoft Yi Baiti"/>
+        <a:font script="Tibt" typeface="Microsoft Himalaya"/>
+        <a:font script="Thaa" typeface="MV Boli"/>
+        <a:font script="Deva" typeface="Mangal"/>
+        <a:font script="Telu" typeface="Gautami"/>
+        <a:font script="Taml" typeface="Latha"/>
+        <a:font script="Syrc" typeface="Estrangelo Edessa"/>
+        <a:font script="Orya" typeface="Kalinga"/>
+        <a:font script="Mlym" typeface="Kartika"/>
+        <a:font script="Laoo" typeface="DokChampa"/>
+        <a:font script="Sinh" typeface="Iskoola Pota"/>
+        <a:font script="Mong" typeface="Mongolian Baiti"/>
+        <a:font script="Viet" typeface="Times New Roman"/>
+        <a:font script="Uigh" typeface="Microsoft Uighur"/>
+        <a:font script="Geor" typeface="Sylfaen"/>
+        <a:font script="Armn" typeface="Arial"/>
+        <a:font script="Bugi" typeface="Leelawadee UI"/>
+        <a:font script="Bopo" typeface="Microsoft JhengHei"/>
+        <a:font script="Java" typeface="Javanese Text"/>
+        <a:font script="Lisu" typeface="Segoe UI"/>
+        <a:font script="Mymr" typeface="Myanmar Text"/>
+        <a:font script="Nkoo" typeface="Ebrima"/>
+        <a:font script="Olck" typeface="Nirmala UI"/>
+        <a:font script="Osma" typeface="Ebrima"/>
+        <a:font script="Phag" typeface="Phagspa"/>
+        <a:font script="Syrn" typeface="Estrangelo Edessa"/>
+        <a:font script="Syrj" typeface="Estrangelo Edessa"/>
+        <a:font script="Syre" typeface="Estrangelo Edessa"/>
+        <a:font script="Sora" typeface="Nirmala UI"/>
+        <a:font script="Tale" typeface="Microsoft Tai Le"/>
+        <a:font script="Talu" typeface="Microsoft New Tai Lue"/>
+        <a:font script="Tfng" typeface="Ebrima"/>
+      </a:majorFont>
+      <a:minorFont>
+        <a:latin typeface="Aptos" panose="02110004020202020204"/>
+        <a:ea typeface=""/>
+        <a:cs typeface=""/>
+        <a:font script="Jpan" typeface="游ゴシック"/>
+        <a:font script="Hang" typeface="맑은 고딕"/>
+        <a:font script="Hans" typeface="等线"/>
+        <a:font script="Hant" typeface="新細明體"/>
+        <a:font script="Arab" typeface="Arial"/>
+        <a:font script="Hebr" typeface="Arial"/>
+        <a:font script="Thai" typeface="Cordia New"/>
+        <a:font script="Ethi" typeface="Nyala"/>
+        <a:font script="Beng" typeface="Vrinda"/>
+        <a:font script="Gujr" typeface="Shruti"/>
+        <a:font script="Khmr" typeface="DaunPenh"/>
+        <a:font script="Knda" typeface="Tunga"/>
+        <a:font script="Guru" typeface="Raavi"/>
+        <a:font script="Cans" typeface="Euphemia"/>
+        <a:font script="Cher" typeface="Plantagenet Cherokee"/>
+        <a:font script="Yiii" typeface="Microsoft Yi Baiti"/>
+        <a:font script="Tibt" typeface="Microsoft Himalaya"/>
+        <a:font script="Thaa" typeface="MV Boli"/>
+        <a:font script="Deva" typeface="Mangal"/>
+        <a:font script="Telu" typeface="Gautami"/>
+        <a:font script="Taml" typeface="Latha"/>
+        <a:font script="Syrc" typeface="Estrangelo Edessa"/>
+        <a:font script="Orya" typeface="Kalinga"/>
+        <a:font script="Mlym" typeface="Kartika"/>
+        <a:font script="Laoo" typeface="DokChampa"/>
+        <a:font script="Sinh" typeface="Iskoola Pota"/>
+        <a:font script="Mong" typeface="Mongolian Baiti"/>
+        <a:font script="Viet" typeface="Arial"/>
+        <a:font script="Uigh" typeface="Microsoft Uighur"/>
+        <a:font script="Geor" typeface="Sylfaen"/>
+        <a:font script="Armn" typeface="Arial"/>
+        <a:font script="Bugi" typeface="Leelawadee UI"/>
+        <a:font script="Bopo" typeface="Microsoft JhengHei"/>
+        <a:font script="Java" typeface="Javanese Text"/>
+        <a:font script="Lisu" typeface="Segoe UI"/>
+        <a:font script="Mymr" typeface="Myanmar Text"/>
+        <a:font script="Nkoo" typeface="Ebrima"/>
+        <a:font script="Olck" typeface="Nirmala UI"/>
+        <a:font script="Osma" typeface="Ebrima"/>
+        <a:font script="Phag" typeface="Phagspa"/>
+        <a:font script="Syrn" typeface="Estrangelo Edessa"/>
+        <a:font script="Syrj" typeface="Estrangelo Edessa"/>
+        <a:font script="Syre" typeface="Estrangelo Edessa"/>
+        <a:font script="Sora" typeface="Nirmala UI"/>
+        <a:font script="Tale" typeface="Microsoft Tai Le"/>
+        <a:font script="Talu" typeface="Microsoft New Tai Lue"/>
+        <a:font script="Tfng" typeface="Ebrima"/>
+      </a:minorFont>
+    </a:fontScheme>
+    <a:fmtScheme name="Office">
+      <a:fillStyleLst>
+        <a:solidFill>
+          <a:schemeClr val="phClr"/>
+        </a:solidFill>
+        <a:gradFill rotWithShape="1">
+          <a:gsLst>
+            <a:gs pos="0">
+              <a:schemeClr val="phClr">
+                <a:lumMod val="110000"/>
+                <a:satMod val="105000"/>
+                <a:tint val="67000"/>
+              </a:schemeClr>
+            </a:gs>
+            <a:gs pos="50000">
+              <a:schemeClr val="phClr">
+                <a:lumMod val="105000"/>
+                <a:satMod val="103000"/>
+                <a:tint val="73000"/>
+              </a:schemeClr>
+            </a:gs>
+            <a:gs pos="100000">
+              <a:schemeClr val="phClr">
+                <a:lumMod val="105000"/>
+                <a:satMod val="109000"/>
+                <a:tint val="81000"/>
+              </a:schemeClr>
+            </a:gs>
+          </a:gsLst>
+          <a:lin ang="5400000" scaled="0"/>
+        </a:gradFill>
+        <a:gradFill rotWithShape="1">
+          <a:gsLst>
+            <a:gs pos="0">
+              <a:schemeClr val="phClr">
+                <a:satMod val="103000"/>
+                <a:lumMod val="102000"/>
+                <a:tint val="94000"/>
+              </a:schemeClr>
+            </a:gs>
+            <a:gs pos="50000">
+              <a:schemeClr val="phClr">
+                <a:satMod val="110000"/>
+                <a:lumMod val="100000"/>
+                <a:shade val="100000"/>
+              </a:schemeClr>
+            </a:gs>
+            <a:gs pos="100000">
+              <a:schemeClr val="phClr">
+                <a:lumMod val="99000"/>
+                <a:satMod val="120000"/>
+                <a:shade val="78000"/>
+              </a:schemeClr>
+            </a:gs>
+          </a:gsLst>
+          <a:lin ang="5400000" scaled="0"/>
+        </a:gradFill>
+      </a:fillStyleLst>
+      <a:lnStyleLst>
+        <a:ln w="12700" cap="flat" cmpd="sng" algn="ctr">
+          <a:solidFill>
+            <a:schemeClr val="phClr"/>
+          </a:solidFill>
+          <a:prstDash val="solid"/>
+          <a:miter lim="800000"/>
+        </a:ln>
+        <a:ln w="19050" cap="flat" cmpd="sng" algn="ctr">
+          <a:solidFill>
+            <a:schemeClr val="phClr"/>
+          </a:solidFill>
+          <a:prstDash val="solid"/>
+          <a:miter lim="800000"/>
+        </a:ln>
+        <a:ln w="25400" cap="flat" cmpd="sng" algn="ctr">
+          <a:solidFill>
+            <a:schemeClr val="phClr"/>
+          </a:solidFill>
+          <a:prstDash val="solid"/>
+          <a:miter lim="800000"/>
+        </a:ln>
+      </a:lnStyleLst>
+      <a:effectStyleLst>
+        <a:effectStyle>
+          <a:effectLst/>
+        </a:effectStyle>
+        <a:effectStyle>
+          <a:effectLst/>
+        </a:effectStyle>
+        <a:effectStyle>
+          <a:effectLst>
+            <a:outerShdw blurRad="57150" dist="19050" dir="5400000" algn="ctr" rotWithShape="0">
+              <a:srgbClr val="000000">
+                <a:alpha val="63000"/>
+              </a:srgbClr>
+            </a:outerShdw>
+          </a:effectLst>
+        </a:effectStyle>
+      </a:effectStyleLst>
+      <a:bgFillStyleLst>
+        <a:solidFill>
+          <a:schemeClr val="phClr"/>
+        </a:solidFill>
+        <a:solidFill>
+          <a:schemeClr val="phClr">
+            <a:tint val="95000"/>
+            <a:satMod val="170000"/>
+          </a:schemeClr>
+        </a:solidFill>
+        <a:gradFill rotWithShape="1">
+          <a:gsLst>
+            <a:gs pos="0">
+              <a:schemeClr val="phClr">
+                <a:tint val="93000"/>
+                <a:satMod val="150000"/>
+                <a:shade val="98000"/>
+                <a:lumMod val="102000"/>
+              </a:schemeClr>
+            </a:gs>
+            <a:gs pos="50000">
+              <a:schemeClr val="phClr">
+                <a:tint val="98000"/>
+                <a:satMod val="130000"/>
+                <a:shade val="90000"/>
+                <a:lumMod val="103000"/>
+              </a:schemeClr>
+            </a:gs>
+            <a:gs pos="100000">
+              <a:schemeClr val="phClr">
+                <a:shade val="63000"/>
+                <a:satMod val="120000"/>
+              </a:schemeClr>
+            </a:gs>
+          </a:gsLst>
+          <a:lin ang="5400000" scaled="0"/>
+        </a:gradFill>
+      </a:bgFillStyleLst>
+    </a:fmtScheme>
+  </a:themeElements>
+  <a:objectDefaults>
+    <a:lnDef>
+      <a:spPr/>
+      <a:bodyPr/>
+      <a:lstStyle/>
+      <a:style>
+        <a:lnRef idx="2">
+          <a:schemeClr val="accent1"/>
+        </a:lnRef>
+        <a:fillRef idx="0">
+          <a:schemeClr val="accent1"/>
+        </a:fillRef>
+        <a:effectRef idx="1">
+          <a:schemeClr val="accent1"/>
+        </a:effectRef>
+        <a:fontRef idx="minor">
+          <a:schemeClr val="tx1"/>
+        </a:fontRef>
+      </a:style>
+    </a:lnDef>
+  </a:objectDefaults>
+  <a:extraClrSchemeLst/>
+  <a:extLst>
+    <a:ext uri="{05A4C25C-085E-4340-85A3-A5531E510DB2}">
+      <thm15:themeFamily xmlns:thm15="http://schemas.microsoft.com/office/thememl/2012/main" name="Office Theme" id="{2E142A2C-CD16-42D6-873A-C26D2A0506FA}" vid="{1BDDFF52-6CD6-40A5-AB3C-68EB2F1E4D0A}"/>
+    </a:ext>
+  </a:extLst>
+</a:theme>
 </file>
</xml_diff>